<commit_message>
merge bm25s index. work on query transforms
</commit_message>
<xml_diff>
--- a/architecture/Project Presentation v1.pptx
+++ b/architecture/Project Presentation v1.pptx
@@ -28,6 +28,7 @@
     <p:sldId id="272" r:id="rId21"/>
     <p:sldId id="273" r:id="rId22"/>
     <p:sldId id="274" r:id="rId23"/>
+    <p:sldId id="275" r:id="rId24"/>
   </p:sldIdLst>
   <p:sldSz cx="10080625" cy="5670550"/>
   <p:notesSz cx="7559675" cy="10691813"/>
@@ -384,7 +385,7 @@
             <a:pPr indent="0" algn="r">
               <a:buNone/>
             </a:pPr>
-            <a:fld id="{393ACA19-47FE-4EE3-85CC-B2B156D547FE}" type="slidenum">
+            <a:fld id="{59B74293-46AB-42A7-89C0-7BCFF3AA9803}" type="slidenum">
               <a:rPr b="0" lang="en-AU" sz="1400" strike="noStrike" u="none">
                 <a:solidFill>
                   <a:srgbClr val="000000"/>
@@ -413,227 +414,6 @@
 </file>
 
 <file path=ppt/notesSlides/notesSlide12.xml><?xml version="1.0" encoding="utf-8"?>
-<p:notes xmlns:a="http://schemas.openxmlformats.org/drawingml/2006/main" xmlns:p="http://schemas.openxmlformats.org/presentationml/2006/main" xmlns:r="http://schemas.openxmlformats.org/officeDocument/2006/relationships" xmlns:p14="http://schemas.microsoft.com/office/powerpoint/2010/main" xmlns:p15="http://schemas.microsoft.com/office/powerpoint/2012/main" xmlns:mc="http://schemas.openxmlformats.org/markup-compatibility/2006">
-  <p:cSld>
-    <p:spTree>
-      <p:nvGrpSpPr>
-        <p:cNvPr id="1" name=""/>
-        <p:cNvGrpSpPr/>
-        <p:nvPr/>
-      </p:nvGrpSpPr>
-      <p:grpSpPr>
-        <a:xfrm>
-          <a:off x="0" y="0"/>
-          <a:ext cx="0" cy="0"/>
-          <a:chOff x="0" y="0"/>
-          <a:chExt cx="0" cy="0"/>
-        </a:xfrm>
-      </p:grpSpPr>
-      <p:sp>
-        <p:nvSpPr>
-          <p:cNvPr id="89" name="PlaceHolder 1"/>
-          <p:cNvSpPr>
-            <a:spLocks noGrp="1"/>
-          </p:cNvSpPr>
-          <p:nvPr>
-            <p:ph type="sldImg"/>
-          </p:nvPr>
-        </p:nvSpPr>
-        <p:spPr>
-          <a:xfrm>
-            <a:off x="216000" y="812520"/>
-            <a:ext cx="7126920" cy="4008600"/>
-          </a:xfrm>
-          <a:prstGeom prst="rect">
-            <a:avLst/>
-          </a:prstGeom>
-          <a:ln w="0">
-            <a:noFill/>
-          </a:ln>
-        </p:spPr>
-      </p:sp>
-      <p:sp>
-        <p:nvSpPr>
-          <p:cNvPr id="90" name="PlaceHolder 2"/>
-          <p:cNvSpPr>
-            <a:spLocks noGrp="1"/>
-          </p:cNvSpPr>
-          <p:nvPr>
-            <p:ph type="body"/>
-          </p:nvPr>
-        </p:nvSpPr>
-        <p:spPr>
-          <a:xfrm>
-            <a:off x="756000" y="5078520"/>
-            <a:ext cx="6047280" cy="4810680"/>
-          </a:xfrm>
-          <a:prstGeom prst="rect">
-            <a:avLst/>
-          </a:prstGeom>
-          <a:noFill/>
-          <a:ln w="0">
-            <a:noFill/>
-          </a:ln>
-        </p:spPr>
-        <p:txBody>
-          <a:bodyPr lIns="0" rIns="0" tIns="0" bIns="0" anchor="t">
-            <a:noAutofit/>
-          </a:bodyPr>
-          <a:p>
-            <a:pPr indent="0">
-              <a:lnSpc>
-                <a:spcPct val="100000"/>
-              </a:lnSpc>
-              <a:buNone/>
-              <a:tabLst>
-                <a:tab algn="l" pos="0"/>
-              </a:tabLst>
-            </a:pPr>
-            <a:r>
-              <a:rPr b="0" lang="en-AU" sz="2000" strike="noStrike" u="none">
-                <a:solidFill>
-                  <a:srgbClr val="000000"/>
-                </a:solidFill>
-                <a:effectLst/>
-                <a:uFillTx/>
-                <a:latin typeface="Arial"/>
-              </a:rPr>
-              <a:t>Operator extracts private data from unstructured documents</a:t>
-            </a:r>
-            <a:endParaRPr b="0" lang="en-AU" sz="2000" strike="noStrike" u="none">
-              <a:solidFill>
-                <a:srgbClr val="000000"/>
-              </a:solidFill>
-              <a:effectLst/>
-              <a:uFillTx/>
-              <a:latin typeface="Arial"/>
-            </a:endParaRPr>
-          </a:p>
-          <a:p>
-            <a:pPr indent="0">
-              <a:lnSpc>
-                <a:spcPct val="100000"/>
-              </a:lnSpc>
-              <a:buNone/>
-              <a:tabLst>
-                <a:tab algn="l" pos="0"/>
-              </a:tabLst>
-            </a:pPr>
-            <a:endParaRPr b="0" lang="en-AU" sz="2000" strike="noStrike" u="none">
-              <a:solidFill>
-                <a:srgbClr val="000000"/>
-              </a:solidFill>
-              <a:effectLst/>
-              <a:uFillTx/>
-              <a:latin typeface="Arial"/>
-            </a:endParaRPr>
-          </a:p>
-          <a:p>
-            <a:pPr indent="0">
-              <a:lnSpc>
-                <a:spcPct val="100000"/>
-              </a:lnSpc>
-              <a:buNone/>
-              <a:tabLst>
-                <a:tab algn="l" pos="0"/>
-              </a:tabLst>
-            </a:pPr>
-            <a:r>
-              <a:rPr b="0" lang="en-AU" sz="2000" strike="noStrike" u="none">
-                <a:solidFill>
-                  <a:srgbClr val="000000"/>
-                </a:solidFill>
-                <a:effectLst/>
-                <a:uFillTx/>
-                <a:latin typeface="Arial"/>
-              </a:rPr>
-              <a:t>Operator monitors quality of data</a:t>
-            </a:r>
-            <a:endParaRPr b="0" lang="en-AU" sz="2000" strike="noStrike" u="none">
-              <a:solidFill>
-                <a:srgbClr val="000000"/>
-              </a:solidFill>
-              <a:effectLst/>
-              <a:uFillTx/>
-              <a:latin typeface="Arial"/>
-            </a:endParaRPr>
-          </a:p>
-          <a:p>
-            <a:pPr indent="0">
-              <a:lnSpc>
-                <a:spcPct val="100000"/>
-              </a:lnSpc>
-              <a:buNone/>
-              <a:tabLst>
-                <a:tab algn="l" pos="0"/>
-              </a:tabLst>
-            </a:pPr>
-            <a:endParaRPr b="0" lang="en-AU" sz="2000" strike="noStrike" u="none">
-              <a:solidFill>
-                <a:srgbClr val="000000"/>
-              </a:solidFill>
-              <a:effectLst/>
-              <a:uFillTx/>
-              <a:latin typeface="Arial"/>
-            </a:endParaRPr>
-          </a:p>
-          <a:p>
-            <a:pPr indent="0">
-              <a:lnSpc>
-                <a:spcPct val="100000"/>
-              </a:lnSpc>
-              <a:buNone/>
-              <a:tabLst>
-                <a:tab algn="l" pos="0"/>
-              </a:tabLst>
-            </a:pPr>
-            <a:r>
-              <a:rPr b="0" lang="en-AU" sz="2000" strike="noStrike" u="none">
-                <a:solidFill>
-                  <a:srgbClr val="000000"/>
-                </a:solidFill>
-                <a:effectLst/>
-                <a:uFillTx/>
-                <a:latin typeface="Arial"/>
-              </a:rPr>
-              <a:t>Operator is a privileged role with access to all the data.</a:t>
-            </a:r>
-            <a:endParaRPr b="0" lang="en-AU" sz="2000" strike="noStrike" u="none">
-              <a:solidFill>
-                <a:srgbClr val="000000"/>
-              </a:solidFill>
-              <a:effectLst/>
-              <a:uFillTx/>
-              <a:latin typeface="Arial"/>
-            </a:endParaRPr>
-          </a:p>
-          <a:p>
-            <a:pPr indent="0">
-              <a:lnSpc>
-                <a:spcPct val="100000"/>
-              </a:lnSpc>
-              <a:buNone/>
-              <a:tabLst>
-                <a:tab algn="l" pos="0"/>
-              </a:tabLst>
-            </a:pPr>
-            <a:endParaRPr b="0" lang="en-AU" sz="2000" strike="noStrike" u="none">
-              <a:solidFill>
-                <a:srgbClr val="000000"/>
-              </a:solidFill>
-              <a:effectLst/>
-              <a:uFillTx/>
-              <a:latin typeface="Arial"/>
-            </a:endParaRPr>
-          </a:p>
-        </p:txBody>
-      </p:sp>
-    </p:spTree>
-  </p:cSld>
-</p:notes>
-</file>
-
-<file path=ppt/notesSlides/notesSlide13.xml><?xml version="1.0" encoding="utf-8"?>
 <p:notes xmlns:a="http://schemas.openxmlformats.org/drawingml/2006/main" xmlns:p="http://schemas.openxmlformats.org/presentationml/2006/main" xmlns:r="http://schemas.openxmlformats.org/officeDocument/2006/relationships" xmlns:p14="http://schemas.microsoft.com/office/powerpoint/2010/main" xmlns:p15="http://schemas.microsoft.com/office/powerpoint/2012/main" xmlns:mc="http://schemas.openxmlformats.org/markup-compatibility/2006">
   <p:cSld>
     <p:spTree>
@@ -663,7 +443,7 @@
         <p:spPr>
           <a:xfrm>
             <a:off x="216000" y="812520"/>
-            <a:ext cx="7126920" cy="4008600"/>
+            <a:ext cx="7126560" cy="4008240"/>
           </a:xfrm>
           <a:prstGeom prst="rect">
             <a:avLst/>
@@ -686,7 +466,7 @@
         <p:spPr>
           <a:xfrm>
             <a:off x="756000" y="5078520"/>
-            <a:ext cx="6047280" cy="4810680"/>
+            <a:ext cx="6046920" cy="4810320"/>
           </a:xfrm>
           <a:prstGeom prst="rect">
             <a:avLst/>
@@ -719,7 +499,7 @@
                 <a:uFillTx/>
                 <a:latin typeface="Arial"/>
               </a:rPr>
-              <a:t>Dual use Indexer app executed as command line script</a:t>
+              <a:t>Operator extracts private data from unstructured documents</a:t>
             </a:r>
             <a:endParaRPr b="0" lang="en-AU" sz="2000" strike="noStrike" u="none">
               <a:solidFill>
@@ -768,7 +548,7 @@
                 <a:uFillTx/>
                 <a:latin typeface="Arial"/>
               </a:rPr>
-              <a:t>Calls to Cloud deployed Gemini LLM consume tokens</a:t>
+              <a:t>Operator monitors quality of data</a:t>
             </a:r>
             <a:endParaRPr b="0" lang="en-AU" sz="2000" strike="noStrike" u="none">
               <a:solidFill>
@@ -817,27 +597,8 @@
                 <a:uFillTx/>
                 <a:latin typeface="Arial"/>
               </a:rPr>
-              <a:t>Call to local RAG database do not consume tokens</a:t>
-            </a:r>
-            <a:endParaRPr b="0" lang="en-AU" sz="2000" strike="noStrike" u="none">
-              <a:solidFill>
-                <a:srgbClr val="000000"/>
-              </a:solidFill>
-              <a:effectLst/>
-              <a:uFillTx/>
-              <a:latin typeface="Arial"/>
-            </a:endParaRPr>
-          </a:p>
-          <a:p>
-            <a:pPr indent="0">
-              <a:lnSpc>
-                <a:spcPct val="100000"/>
-              </a:lnSpc>
-              <a:buNone/>
-              <a:tabLst>
-                <a:tab algn="l" pos="0"/>
-              </a:tabLst>
-            </a:pPr>
+              <a:t>Operator is a privileged role with access to all the data.</a:t>
+            </a:r>
             <a:endParaRPr b="0" lang="en-AU" sz="2000" strike="noStrike" u="none">
               <a:solidFill>
                 <a:srgbClr val="000000"/>
@@ -873,7 +634,7 @@
 </p:notes>
 </file>
 
-<file path=ppt/notesSlides/notesSlide14.xml><?xml version="1.0" encoding="utf-8"?>
+<file path=ppt/notesSlides/notesSlide13.xml><?xml version="1.0" encoding="utf-8"?>
 <p:notes xmlns:a="http://schemas.openxmlformats.org/drawingml/2006/main" xmlns:p="http://schemas.openxmlformats.org/presentationml/2006/main" xmlns:r="http://schemas.openxmlformats.org/officeDocument/2006/relationships" xmlns:p14="http://schemas.microsoft.com/office/powerpoint/2010/main" xmlns:p15="http://schemas.microsoft.com/office/powerpoint/2012/main" xmlns:mc="http://schemas.openxmlformats.org/markup-compatibility/2006">
   <p:cSld>
     <p:spTree>
@@ -902,8 +663,8 @@
         </p:nvSpPr>
         <p:spPr>
           <a:xfrm>
-            <a:off x="216360" y="812520"/>
-            <a:ext cx="7126560" cy="4008600"/>
+            <a:off x="216000" y="812520"/>
+            <a:ext cx="7126560" cy="4008240"/>
           </a:xfrm>
           <a:prstGeom prst="rect">
             <a:avLst/>
@@ -926,7 +687,7 @@
         <p:spPr>
           <a:xfrm>
             <a:off x="756000" y="5078520"/>
-            <a:ext cx="6047280" cy="4810680"/>
+            <a:ext cx="6046920" cy="4810320"/>
           </a:xfrm>
           <a:prstGeom prst="rect">
             <a:avLst/>
@@ -959,7 +720,7 @@
                 <a:uFillTx/>
                 <a:latin typeface="Arial"/>
               </a:rPr>
-              <a:t>Hybrid architecture allows flexibility</a:t>
+              <a:t>Dual use Indexer app executed as command line script</a:t>
             </a:r>
             <a:endParaRPr b="0" lang="en-AU" sz="2000" strike="noStrike" u="none">
               <a:solidFill>
@@ -1008,7 +769,7 @@
                 <a:uFillTx/>
                 <a:latin typeface="Arial"/>
               </a:rPr>
-              <a:t>Where the database is stored</a:t>
+              <a:t>Calls to Cloud deployed Gemini LLM consume tokens</a:t>
             </a:r>
             <a:endParaRPr b="0" lang="en-AU" sz="2000" strike="noStrike" u="none">
               <a:solidFill>
@@ -1057,105 +818,7 @@
                 <a:uFillTx/>
                 <a:latin typeface="Arial"/>
               </a:rPr>
-              <a:t>Where the application itself is deployed</a:t>
-            </a:r>
-            <a:endParaRPr b="0" lang="en-AU" sz="2000" strike="noStrike" u="none">
-              <a:solidFill>
-                <a:srgbClr val="000000"/>
-              </a:solidFill>
-              <a:effectLst/>
-              <a:uFillTx/>
-              <a:latin typeface="Arial"/>
-            </a:endParaRPr>
-          </a:p>
-          <a:p>
-            <a:pPr indent="0">
-              <a:lnSpc>
-                <a:spcPct val="100000"/>
-              </a:lnSpc>
-              <a:buNone/>
-              <a:tabLst>
-                <a:tab algn="l" pos="0"/>
-              </a:tabLst>
-            </a:pPr>
-            <a:endParaRPr b="0" lang="en-AU" sz="2000" strike="noStrike" u="none">
-              <a:solidFill>
-                <a:srgbClr val="000000"/>
-              </a:solidFill>
-              <a:effectLst/>
-              <a:uFillTx/>
-              <a:latin typeface="Arial"/>
-            </a:endParaRPr>
-          </a:p>
-          <a:p>
-            <a:pPr indent="0">
-              <a:lnSpc>
-                <a:spcPct val="100000"/>
-              </a:lnSpc>
-              <a:buNone/>
-              <a:tabLst>
-                <a:tab algn="l" pos="0"/>
-              </a:tabLst>
-            </a:pPr>
-            <a:r>
-              <a:rPr b="0" lang="en-AU" sz="2000" strike="noStrike" u="none">
-                <a:solidFill>
-                  <a:srgbClr val="000000"/>
-                </a:solidFill>
-                <a:effectLst/>
-                <a:uFillTx/>
-                <a:latin typeface="Arial"/>
-              </a:rPr>
-              <a:t>What LLM host service is used</a:t>
-            </a:r>
-            <a:endParaRPr b="0" lang="en-AU" sz="2000" strike="noStrike" u="none">
-              <a:solidFill>
-                <a:srgbClr val="000000"/>
-              </a:solidFill>
-              <a:effectLst/>
-              <a:uFillTx/>
-              <a:latin typeface="Arial"/>
-            </a:endParaRPr>
-          </a:p>
-          <a:p>
-            <a:pPr indent="0">
-              <a:lnSpc>
-                <a:spcPct val="100000"/>
-              </a:lnSpc>
-              <a:buNone/>
-              <a:tabLst>
-                <a:tab algn="l" pos="0"/>
-              </a:tabLst>
-            </a:pPr>
-            <a:endParaRPr b="0" lang="en-AU" sz="2000" strike="noStrike" u="none">
-              <a:solidFill>
-                <a:srgbClr val="000000"/>
-              </a:solidFill>
-              <a:effectLst/>
-              <a:uFillTx/>
-              <a:latin typeface="Arial"/>
-            </a:endParaRPr>
-          </a:p>
-          <a:p>
-            <a:pPr indent="0">
-              <a:lnSpc>
-                <a:spcPct val="100000"/>
-              </a:lnSpc>
-              <a:buNone/>
-              <a:tabLst>
-                <a:tab algn="l" pos="0"/>
-              </a:tabLst>
-            </a:pPr>
-            <a:r>
-              <a:rPr b="0" lang="en-AU" sz="2000" strike="noStrike" u="none">
-                <a:solidFill>
-                  <a:srgbClr val="000000"/>
-                </a:solidFill>
-                <a:effectLst/>
-                <a:uFillTx/>
-                <a:latin typeface="Arial"/>
-              </a:rPr>
-              <a:t>All of these components can be configured to minimise operational expenses</a:t>
+              <a:t>Call to local RAG database do not consume tokens</a:t>
             </a:r>
             <a:endParaRPr b="0" lang="en-AU" sz="2000" strike="noStrike" u="none">
               <a:solidFill>
@@ -1211,7 +874,7 @@
 </p:notes>
 </file>
 
-<file path=ppt/notesSlides/notesSlide16.xml><?xml version="1.0" encoding="utf-8"?>
+<file path=ppt/notesSlides/notesSlide14.xml><?xml version="1.0" encoding="utf-8"?>
 <p:notes xmlns:a="http://schemas.openxmlformats.org/drawingml/2006/main" xmlns:p="http://schemas.openxmlformats.org/presentationml/2006/main" xmlns:r="http://schemas.openxmlformats.org/officeDocument/2006/relationships" xmlns:p14="http://schemas.microsoft.com/office/powerpoint/2010/main" xmlns:p15="http://schemas.microsoft.com/office/powerpoint/2012/main" xmlns:mc="http://schemas.openxmlformats.org/markup-compatibility/2006">
   <p:cSld>
     <p:spTree>
@@ -1240,8 +903,8 @@
         </p:nvSpPr>
         <p:spPr>
           <a:xfrm>
-            <a:off x="216000" y="812520"/>
-            <a:ext cx="7126920" cy="4008600"/>
+            <a:off x="216360" y="812520"/>
+            <a:ext cx="7126200" cy="4008240"/>
           </a:xfrm>
           <a:prstGeom prst="rect">
             <a:avLst/>
@@ -1264,7 +927,7 @@
         <p:spPr>
           <a:xfrm>
             <a:off x="756000" y="5078520"/>
-            <a:ext cx="6047280" cy="4810680"/>
+            <a:ext cx="6046920" cy="4810320"/>
           </a:xfrm>
           <a:prstGeom prst="rect">
             <a:avLst/>
@@ -1297,7 +960,7 @@
                 <a:uFillTx/>
                 <a:latin typeface="Arial"/>
               </a:rPr>
-              <a:t>Query application uses RAG database and cloud deployed LLM</a:t>
+              <a:t>Hybrid architecture allows flexibility</a:t>
             </a:r>
             <a:endParaRPr b="0" lang="en-AU" sz="2000" strike="noStrike" u="none">
               <a:solidFill>
@@ -1346,7 +1009,7 @@
                 <a:uFillTx/>
                 <a:latin typeface="Arial"/>
               </a:rPr>
-              <a:t>Cloud access via REST API specific to the LLM provider</a:t>
+              <a:t>Where the database is stored</a:t>
             </a:r>
             <a:endParaRPr b="0" lang="en-AU" sz="2000" strike="noStrike" u="none">
               <a:solidFill>
@@ -1395,7 +1058,7 @@
                 <a:uFillTx/>
                 <a:latin typeface="Arial"/>
               </a:rPr>
-              <a:t>Answer is generated in two steps</a:t>
+              <a:t>Where the application itself is deployed</a:t>
             </a:r>
             <a:endParaRPr b="0" lang="en-AU" sz="2000" strike="noStrike" u="none">
               <a:solidFill>
@@ -1444,7 +1107,7 @@
                 <a:uFillTx/>
                 <a:latin typeface="Arial"/>
               </a:rPr>
-              <a:t>1. RAG database query to select private data set</a:t>
+              <a:t>What LLM host service is used</a:t>
             </a:r>
             <a:endParaRPr b="0" lang="en-AU" sz="2000" strike="noStrike" u="none">
               <a:solidFill>
@@ -1493,27 +1156,8 @@
                 <a:uFillTx/>
                 <a:latin typeface="Arial"/>
               </a:rPr>
-              <a:t>2. Combine initial query with RAG data in the final LLM query.</a:t>
-            </a:r>
-            <a:endParaRPr b="0" lang="en-AU" sz="2000" strike="noStrike" u="none">
-              <a:solidFill>
-                <a:srgbClr val="000000"/>
-              </a:solidFill>
-              <a:effectLst/>
-              <a:uFillTx/>
-              <a:latin typeface="Arial"/>
-            </a:endParaRPr>
-          </a:p>
-          <a:p>
-            <a:pPr indent="0">
-              <a:lnSpc>
-                <a:spcPct val="100000"/>
-              </a:lnSpc>
-              <a:buNone/>
-              <a:tabLst>
-                <a:tab algn="l" pos="0"/>
-              </a:tabLst>
-            </a:pPr>
+              <a:t>All of these components can be configured to minimise operational expenses</a:t>
+            </a:r>
             <a:endParaRPr b="0" lang="en-AU" sz="2000" strike="noStrike" u="none">
               <a:solidFill>
                 <a:srgbClr val="000000"/>
@@ -1568,7 +1212,7 @@
 </p:notes>
 </file>
 
-<file path=ppt/notesSlides/notesSlide17.xml><?xml version="1.0" encoding="utf-8"?>
+<file path=ppt/notesSlides/notesSlide16.xml><?xml version="1.0" encoding="utf-8"?>
 <p:notes xmlns:a="http://schemas.openxmlformats.org/drawingml/2006/main" xmlns:p="http://schemas.openxmlformats.org/presentationml/2006/main" xmlns:r="http://schemas.openxmlformats.org/officeDocument/2006/relationships" xmlns:p14="http://schemas.microsoft.com/office/powerpoint/2010/main" xmlns:p15="http://schemas.microsoft.com/office/powerpoint/2012/main" xmlns:mc="http://schemas.openxmlformats.org/markup-compatibility/2006">
   <p:cSld>
     <p:spTree>
@@ -1598,7 +1242,7 @@
         <p:spPr>
           <a:xfrm>
             <a:off x="216000" y="812520"/>
-            <a:ext cx="7126920" cy="4008600"/>
+            <a:ext cx="7126560" cy="4008240"/>
           </a:xfrm>
           <a:prstGeom prst="rect">
             <a:avLst/>
@@ -1621,7 +1265,7 @@
         <p:spPr>
           <a:xfrm>
             <a:off x="756000" y="5078520"/>
-            <a:ext cx="6047280" cy="4810680"/>
+            <a:ext cx="6046920" cy="4810320"/>
           </a:xfrm>
           <a:prstGeom prst="rect">
             <a:avLst/>
@@ -1654,7 +1298,7 @@
                 <a:uFillTx/>
                 <a:latin typeface="Arial"/>
               </a:rPr>
-              <a:t>Original query is XSS</a:t>
+              <a:t>Query application uses RAG database and cloud deployed LLM</a:t>
             </a:r>
             <a:endParaRPr b="0" lang="en-AU" sz="2000" strike="noStrike" u="none">
               <a:solidFill>
@@ -1703,7 +1347,7 @@
                 <a:uFillTx/>
                 <a:latin typeface="Arial"/>
               </a:rPr>
-              <a:t>RAG database is queried for list of synonyms </a:t>
+              <a:t>Cloud access via REST API specific to the LLM provider</a:t>
             </a:r>
             <a:endParaRPr b="0" lang="en-AU" sz="2000" strike="noStrike" u="none">
               <a:solidFill>
@@ -1752,7 +1396,105 @@
                 <a:uFillTx/>
                 <a:latin typeface="Arial"/>
               </a:rPr>
-              <a:t>Returns from RAG queries create context for the final call to general LLM</a:t>
+              <a:t>Answer is generated in two steps</a:t>
+            </a:r>
+            <a:endParaRPr b="0" lang="en-AU" sz="2000" strike="noStrike" u="none">
+              <a:solidFill>
+                <a:srgbClr val="000000"/>
+              </a:solidFill>
+              <a:effectLst/>
+              <a:uFillTx/>
+              <a:latin typeface="Arial"/>
+            </a:endParaRPr>
+          </a:p>
+          <a:p>
+            <a:pPr indent="0">
+              <a:lnSpc>
+                <a:spcPct val="100000"/>
+              </a:lnSpc>
+              <a:buNone/>
+              <a:tabLst>
+                <a:tab algn="l" pos="0"/>
+              </a:tabLst>
+            </a:pPr>
+            <a:endParaRPr b="0" lang="en-AU" sz="2000" strike="noStrike" u="none">
+              <a:solidFill>
+                <a:srgbClr val="000000"/>
+              </a:solidFill>
+              <a:effectLst/>
+              <a:uFillTx/>
+              <a:latin typeface="Arial"/>
+            </a:endParaRPr>
+          </a:p>
+          <a:p>
+            <a:pPr indent="0">
+              <a:lnSpc>
+                <a:spcPct val="100000"/>
+              </a:lnSpc>
+              <a:buNone/>
+              <a:tabLst>
+                <a:tab algn="l" pos="0"/>
+              </a:tabLst>
+            </a:pPr>
+            <a:r>
+              <a:rPr b="0" lang="en-AU" sz="2000" strike="noStrike" u="none">
+                <a:solidFill>
+                  <a:srgbClr val="000000"/>
+                </a:solidFill>
+                <a:effectLst/>
+                <a:uFillTx/>
+                <a:latin typeface="Arial"/>
+              </a:rPr>
+              <a:t>1. RAG database query to select private data set</a:t>
+            </a:r>
+            <a:endParaRPr b="0" lang="en-AU" sz="2000" strike="noStrike" u="none">
+              <a:solidFill>
+                <a:srgbClr val="000000"/>
+              </a:solidFill>
+              <a:effectLst/>
+              <a:uFillTx/>
+              <a:latin typeface="Arial"/>
+            </a:endParaRPr>
+          </a:p>
+          <a:p>
+            <a:pPr indent="0">
+              <a:lnSpc>
+                <a:spcPct val="100000"/>
+              </a:lnSpc>
+              <a:buNone/>
+              <a:tabLst>
+                <a:tab algn="l" pos="0"/>
+              </a:tabLst>
+            </a:pPr>
+            <a:endParaRPr b="0" lang="en-AU" sz="2000" strike="noStrike" u="none">
+              <a:solidFill>
+                <a:srgbClr val="000000"/>
+              </a:solidFill>
+              <a:effectLst/>
+              <a:uFillTx/>
+              <a:latin typeface="Arial"/>
+            </a:endParaRPr>
+          </a:p>
+          <a:p>
+            <a:pPr indent="0">
+              <a:lnSpc>
+                <a:spcPct val="100000"/>
+              </a:lnSpc>
+              <a:buNone/>
+              <a:tabLst>
+                <a:tab algn="l" pos="0"/>
+              </a:tabLst>
+            </a:pPr>
+            <a:r>
+              <a:rPr b="0" lang="en-AU" sz="2000" strike="noStrike" u="none">
+                <a:solidFill>
+                  <a:srgbClr val="000000"/>
+                </a:solidFill>
+                <a:effectLst/>
+                <a:uFillTx/>
+                <a:latin typeface="Arial"/>
+              </a:rPr>
+              <a:t>2. Combine initial query with RAG data in the final LLM query.</a:t>
             </a:r>
             <a:endParaRPr b="0" lang="en-AU" sz="2000" strike="noStrike" u="none">
               <a:solidFill>
@@ -1827,7 +1569,7 @@
 </p:notes>
 </file>
 
-<file path=ppt/notesSlides/notesSlide18.xml><?xml version="1.0" encoding="utf-8"?>
+<file path=ppt/notesSlides/notesSlide17.xml><?xml version="1.0" encoding="utf-8"?>
 <p:notes xmlns:a="http://schemas.openxmlformats.org/drawingml/2006/main" xmlns:p="http://schemas.openxmlformats.org/presentationml/2006/main" xmlns:r="http://schemas.openxmlformats.org/officeDocument/2006/relationships" xmlns:p14="http://schemas.microsoft.com/office/powerpoint/2010/main" xmlns:p15="http://schemas.microsoft.com/office/powerpoint/2012/main" xmlns:mc="http://schemas.openxmlformats.org/markup-compatibility/2006">
   <p:cSld>
     <p:spTree>
@@ -1857,7 +1599,7 @@
         <p:spPr>
           <a:xfrm>
             <a:off x="216000" y="812520"/>
-            <a:ext cx="7126920" cy="4008600"/>
+            <a:ext cx="7126560" cy="4008240"/>
           </a:xfrm>
           <a:prstGeom prst="rect">
             <a:avLst/>
@@ -1880,7 +1622,7 @@
         <p:spPr>
           <a:xfrm>
             <a:off x="756000" y="5078520"/>
-            <a:ext cx="6047280" cy="4810680"/>
+            <a:ext cx="6046920" cy="4810320"/>
           </a:xfrm>
           <a:prstGeom prst="rect">
             <a:avLst/>
@@ -1913,7 +1655,7 @@
                 <a:uFillTx/>
                 <a:latin typeface="Arial"/>
               </a:rPr>
-              <a:t>Final query to general LLM asks about PCI DSS</a:t>
+              <a:t>Original query is XSS</a:t>
             </a:r>
             <a:endParaRPr b="0" lang="en-AU" sz="2000" strike="noStrike" u="none">
               <a:solidFill>
@@ -1962,7 +1704,56 @@
                 <a:uFillTx/>
                 <a:latin typeface="Arial"/>
               </a:rPr>
-              <a:t>RAG query result is incorporated as a structured input</a:t>
+              <a:t>RAG database is queried for list of synonyms </a:t>
+            </a:r>
+            <a:endParaRPr b="0" lang="en-AU" sz="2000" strike="noStrike" u="none">
+              <a:solidFill>
+                <a:srgbClr val="000000"/>
+              </a:solidFill>
+              <a:effectLst/>
+              <a:uFillTx/>
+              <a:latin typeface="Arial"/>
+            </a:endParaRPr>
+          </a:p>
+          <a:p>
+            <a:pPr indent="0">
+              <a:lnSpc>
+                <a:spcPct val="100000"/>
+              </a:lnSpc>
+              <a:buNone/>
+              <a:tabLst>
+                <a:tab algn="l" pos="0"/>
+              </a:tabLst>
+            </a:pPr>
+            <a:endParaRPr b="0" lang="en-AU" sz="2000" strike="noStrike" u="none">
+              <a:solidFill>
+                <a:srgbClr val="000000"/>
+              </a:solidFill>
+              <a:effectLst/>
+              <a:uFillTx/>
+              <a:latin typeface="Arial"/>
+            </a:endParaRPr>
+          </a:p>
+          <a:p>
+            <a:pPr indent="0">
+              <a:lnSpc>
+                <a:spcPct val="100000"/>
+              </a:lnSpc>
+              <a:buNone/>
+              <a:tabLst>
+                <a:tab algn="l" pos="0"/>
+              </a:tabLst>
+            </a:pPr>
+            <a:r>
+              <a:rPr b="0" lang="en-AU" sz="2000" strike="noStrike" u="none">
+                <a:solidFill>
+                  <a:srgbClr val="000000"/>
+                </a:solidFill>
+                <a:effectLst/>
+                <a:uFillTx/>
+                <a:latin typeface="Arial"/>
+              </a:rPr>
+              <a:t>Returns from RAG queries create context for the final call to general LLM</a:t>
             </a:r>
             <a:endParaRPr b="0" lang="en-AU" sz="2000" strike="noStrike" u="none">
               <a:solidFill>
@@ -2037,7 +1828,7 @@
 </p:notes>
 </file>
 
-<file path=ppt/notesSlides/notesSlide19.xml><?xml version="1.0" encoding="utf-8"?>
+<file path=ppt/notesSlides/notesSlide18.xml><?xml version="1.0" encoding="utf-8"?>
 <p:notes xmlns:a="http://schemas.openxmlformats.org/drawingml/2006/main" xmlns:p="http://schemas.openxmlformats.org/presentationml/2006/main" xmlns:r="http://schemas.openxmlformats.org/officeDocument/2006/relationships" xmlns:p14="http://schemas.microsoft.com/office/powerpoint/2010/main" xmlns:p15="http://schemas.microsoft.com/office/powerpoint/2012/main" xmlns:mc="http://schemas.openxmlformats.org/markup-compatibility/2006">
   <p:cSld>
     <p:spTree>
@@ -2067,7 +1858,7 @@
         <p:spPr>
           <a:xfrm>
             <a:off x="216000" y="812520"/>
-            <a:ext cx="7126920" cy="4008600"/>
+            <a:ext cx="7126560" cy="4008240"/>
           </a:xfrm>
           <a:prstGeom prst="rect">
             <a:avLst/>
@@ -2090,7 +1881,7 @@
         <p:spPr>
           <a:xfrm>
             <a:off x="756000" y="5078520"/>
-            <a:ext cx="6047280" cy="4810680"/>
+            <a:ext cx="6046920" cy="4810320"/>
           </a:xfrm>
           <a:prstGeom prst="rect">
             <a:avLst/>
@@ -2123,7 +1914,7 @@
                 <a:uFillTx/>
                 <a:latin typeface="Arial"/>
               </a:rPr>
-              <a:t>The reply from general LLM incorporates:</a:t>
+              <a:t>Final query to general LLM asks about PCI DSS</a:t>
             </a:r>
             <a:endParaRPr b="0" lang="en-AU" sz="2000" strike="noStrike" u="none">
               <a:solidFill>
@@ -2172,114 +1963,8 @@
                 <a:uFillTx/>
                 <a:latin typeface="Arial"/>
               </a:rPr>
-              <a:t>- private data</a:t>
-            </a:r>
-            <a:endParaRPr b="0" lang="en-AU" sz="2000" strike="noStrike" u="none">
-              <a:solidFill>
-                <a:srgbClr val="000000"/>
-              </a:solidFill>
-              <a:effectLst/>
-              <a:uFillTx/>
-              <a:latin typeface="Arial"/>
-            </a:endParaRPr>
-          </a:p>
-          <a:p>
-            <a:pPr indent="0">
-              <a:lnSpc>
-                <a:spcPct val="100000"/>
-              </a:lnSpc>
-              <a:buNone/>
-              <a:tabLst>
-                <a:tab algn="l" pos="0"/>
-              </a:tabLst>
-            </a:pPr>
-            <a:endParaRPr b="0" lang="en-AU" sz="2000" strike="noStrike" u="none">
-              <a:solidFill>
-                <a:srgbClr val="000000"/>
-              </a:solidFill>
-              <a:effectLst/>
-              <a:uFillTx/>
-              <a:latin typeface="Arial"/>
-            </a:endParaRPr>
-          </a:p>
-          <a:p>
-            <a:pPr indent="0">
-              <a:lnSpc>
-                <a:spcPct val="100000"/>
-              </a:lnSpc>
-              <a:buNone/>
-              <a:tabLst>
-                <a:tab algn="l" pos="0"/>
-              </a:tabLst>
-            </a:pPr>
-            <a:r>
-              <a:rPr b="0" lang="en-AU" sz="2000" strike="noStrike" u="none">
-                <a:solidFill>
-                  <a:srgbClr val="000000"/>
-                </a:solidFill>
-                <a:effectLst/>
-                <a:uFillTx/>
-                <a:latin typeface="Arial"/>
-              </a:rPr>
-              <a:t>- public data in the form of PCI DSS</a:t>
-            </a:r>
-            <a:endParaRPr b="0" lang="en-AU" sz="2000" strike="noStrike" u="none">
-              <a:solidFill>
-                <a:srgbClr val="000000"/>
-              </a:solidFill>
-              <a:effectLst/>
-              <a:uFillTx/>
-              <a:latin typeface="Arial"/>
-            </a:endParaRPr>
-          </a:p>
-          <a:p>
-            <a:pPr indent="0">
-              <a:lnSpc>
-                <a:spcPct val="100000"/>
-              </a:lnSpc>
-              <a:buNone/>
-              <a:tabLst>
-                <a:tab algn="l" pos="0"/>
-              </a:tabLst>
-            </a:pPr>
-            <a:endParaRPr b="0" lang="en-AU" sz="2000" strike="noStrike" u="none">
-              <a:solidFill>
-                <a:srgbClr val="000000"/>
-              </a:solidFill>
-              <a:effectLst/>
-              <a:uFillTx/>
-              <a:latin typeface="Arial"/>
-            </a:endParaRPr>
-          </a:p>
-          <a:p>
-            <a:pPr indent="0">
-              <a:lnSpc>
-                <a:spcPct val="100000"/>
-              </a:lnSpc>
-              <a:buNone/>
-              <a:tabLst>
-                <a:tab algn="l" pos="0"/>
-              </a:tabLst>
-            </a:pPr>
-            <a:endParaRPr b="0" lang="en-AU" sz="2000" strike="noStrike" u="none">
-              <a:solidFill>
-                <a:srgbClr val="000000"/>
-              </a:solidFill>
-              <a:effectLst/>
-              <a:uFillTx/>
-              <a:latin typeface="Arial"/>
-            </a:endParaRPr>
-          </a:p>
-          <a:p>
-            <a:pPr indent="0">
-              <a:lnSpc>
-                <a:spcPct val="100000"/>
-              </a:lnSpc>
-              <a:buNone/>
-              <a:tabLst>
-                <a:tab algn="l" pos="0"/>
-              </a:tabLst>
-            </a:pPr>
+              <a:t>RAG query result is incorporated as a structured input</a:t>
+            </a:r>
             <a:endParaRPr b="0" lang="en-AU" sz="2000" strike="noStrike" u="none">
               <a:solidFill>
                 <a:srgbClr val="000000"/>
@@ -2353,7 +2038,7 @@
 </p:notes>
 </file>
 
-<file path=ppt/notesSlides/notesSlide2.xml><?xml version="1.0" encoding="utf-8"?>
+<file path=ppt/notesSlides/notesSlide19.xml><?xml version="1.0" encoding="utf-8"?>
 <p:notes xmlns:a="http://schemas.openxmlformats.org/drawingml/2006/main" xmlns:p="http://schemas.openxmlformats.org/presentationml/2006/main" xmlns:r="http://schemas.openxmlformats.org/officeDocument/2006/relationships" xmlns:p14="http://schemas.microsoft.com/office/powerpoint/2010/main" xmlns:p15="http://schemas.microsoft.com/office/powerpoint/2012/main" xmlns:mc="http://schemas.openxmlformats.org/markup-compatibility/2006">
   <p:cSld>
     <p:spTree>
@@ -2372,7 +2057,7 @@
       </p:grpSpPr>
       <p:sp>
         <p:nvSpPr>
-          <p:cNvPr id="73" name="PlaceHolder 1"/>
+          <p:cNvPr id="103" name="PlaceHolder 1"/>
           <p:cNvSpPr>
             <a:spLocks noGrp="1"/>
           </p:cNvSpPr>
@@ -2383,7 +2068,7 @@
         <p:spPr>
           <a:xfrm>
             <a:off x="216000" y="812520"/>
-            <a:ext cx="7126920" cy="4008600"/>
+            <a:ext cx="7126560" cy="4008240"/>
           </a:xfrm>
           <a:prstGeom prst="rect">
             <a:avLst/>
@@ -2395,7 +2080,7 @@
       </p:sp>
       <p:sp>
         <p:nvSpPr>
-          <p:cNvPr id="74" name="PlaceHolder 2"/>
+          <p:cNvPr id="104" name="PlaceHolder 2"/>
           <p:cNvSpPr>
             <a:spLocks noGrp="1"/>
           </p:cNvSpPr>
@@ -2406,7 +2091,7 @@
         <p:spPr>
           <a:xfrm>
             <a:off x="756000" y="5078520"/>
-            <a:ext cx="6047280" cy="4810680"/>
+            <a:ext cx="6046920" cy="4810320"/>
           </a:xfrm>
           <a:prstGeom prst="rect">
             <a:avLst/>
@@ -2439,7 +2124,7 @@
                 <a:uFillTx/>
                 <a:latin typeface="Arial"/>
               </a:rPr>
-              <a:t>Large Language Models allow to replace mundane text generation with automation. This can lead to reduction in labour expenses and increase in profitability.</a:t>
+              <a:t>The reply from general LLM incorporates:</a:t>
             </a:r>
             <a:endParaRPr b="0" lang="en-AU" sz="2000" strike="noStrike" u="none">
               <a:solidFill>
@@ -2488,7 +2173,7 @@
                 <a:uFillTx/>
                 <a:latin typeface="Arial"/>
               </a:rPr>
-              <a:t>Incorporating LLMs require changes in business process.</a:t>
+              <a:t>- private data</a:t>
             </a:r>
             <a:endParaRPr b="0" lang="en-AU" sz="2000" strike="noStrike" u="none">
               <a:solidFill>
@@ -2537,7 +2222,7 @@
                 <a:uFillTx/>
                 <a:latin typeface="Arial"/>
               </a:rPr>
-              <a:t>Every company have access to LLMs trained on public data. Therefore, the knowledge of public data is not a competitive advantage. Only private data gives advantage.</a:t>
+              <a:t>- public data in the form of PCI DSS</a:t>
             </a:r>
             <a:endParaRPr b="0" lang="en-AU" sz="2000" strike="noStrike" u="none">
               <a:solidFill>
@@ -2577,17 +2262,6 @@
                 <a:tab algn="l" pos="0"/>
               </a:tabLst>
             </a:pPr>
-            <a:r>
-              <a:rPr b="0" lang="en-AU" sz="2000" strike="noStrike" u="none">
-                <a:solidFill>
-                  <a:srgbClr val="000000"/>
-                </a:solidFill>
-                <a:effectLst/>
-                <a:uFillTx/>
-                <a:latin typeface="Arial"/>
-              </a:rPr>
-              <a:t>Investing in LLM workflows should focus on using private data. This gives biggest advantage.</a:t>
-            </a:r>
             <a:endParaRPr b="0" lang="en-AU" sz="2000" strike="noStrike" u="none">
               <a:solidFill>
                 <a:srgbClr val="000000"/>
@@ -2626,17 +2300,44 @@
                 <a:tab algn="l" pos="0"/>
               </a:tabLst>
             </a:pPr>
-            <a:r>
-              <a:rPr b="0" lang="en-AU" sz="2000" strike="noStrike" u="none">
-                <a:solidFill>
-                  <a:srgbClr val="000000"/>
-                </a:solidFill>
-                <a:effectLst/>
-                <a:uFillTx/>
-                <a:latin typeface="Arial"/>
-              </a:rPr>
-              <a:t>More context – what we try to automate. – context of security work</a:t>
-            </a:r>
+            <a:endParaRPr b="0" lang="en-AU" sz="2000" strike="noStrike" u="none">
+              <a:solidFill>
+                <a:srgbClr val="000000"/>
+              </a:solidFill>
+              <a:effectLst/>
+              <a:uFillTx/>
+              <a:latin typeface="Arial"/>
+            </a:endParaRPr>
+          </a:p>
+          <a:p>
+            <a:pPr indent="0">
+              <a:lnSpc>
+                <a:spcPct val="100000"/>
+              </a:lnSpc>
+              <a:buNone/>
+              <a:tabLst>
+                <a:tab algn="l" pos="0"/>
+              </a:tabLst>
+            </a:pPr>
+            <a:endParaRPr b="0" lang="en-AU" sz="2000" strike="noStrike" u="none">
+              <a:solidFill>
+                <a:srgbClr val="000000"/>
+              </a:solidFill>
+              <a:effectLst/>
+              <a:uFillTx/>
+              <a:latin typeface="Arial"/>
+            </a:endParaRPr>
+          </a:p>
+          <a:p>
+            <a:pPr indent="0">
+              <a:lnSpc>
+                <a:spcPct val="100000"/>
+              </a:lnSpc>
+              <a:buNone/>
+              <a:tabLst>
+                <a:tab algn="l" pos="0"/>
+              </a:tabLst>
+            </a:pPr>
             <a:endParaRPr b="0" lang="en-AU" sz="2000" strike="noStrike" u="none">
               <a:solidFill>
                 <a:srgbClr val="000000"/>
@@ -2653,7 +2354,7 @@
 </p:notes>
 </file>
 
-<file path=ppt/notesSlides/notesSlide3.xml><?xml version="1.0" encoding="utf-8"?>
+<file path=ppt/notesSlides/notesSlide2.xml><?xml version="1.0" encoding="utf-8"?>
 <p:notes xmlns:a="http://schemas.openxmlformats.org/drawingml/2006/main" xmlns:p="http://schemas.openxmlformats.org/presentationml/2006/main" xmlns:r="http://schemas.openxmlformats.org/officeDocument/2006/relationships" xmlns:p14="http://schemas.microsoft.com/office/powerpoint/2010/main" xmlns:p15="http://schemas.microsoft.com/office/powerpoint/2012/main" xmlns:mc="http://schemas.openxmlformats.org/markup-compatibility/2006">
   <p:cSld>
     <p:spTree>
@@ -2683,7 +2384,7 @@
         <p:spPr>
           <a:xfrm>
             <a:off x="216000" y="812520"/>
-            <a:ext cx="7126920" cy="4008600"/>
+            <a:ext cx="7126560" cy="4008240"/>
           </a:xfrm>
           <a:prstGeom prst="rect">
             <a:avLst/>
@@ -2706,7 +2407,7 @@
         <p:spPr>
           <a:xfrm>
             <a:off x="756000" y="5078520"/>
-            <a:ext cx="6047280" cy="4810680"/>
+            <a:ext cx="6046920" cy="4810320"/>
           </a:xfrm>
           <a:prstGeom prst="rect">
             <a:avLst/>
@@ -2739,7 +2440,7 @@
                 <a:uFillTx/>
                 <a:latin typeface="Arial"/>
               </a:rPr>
-              <a:t>In the example application we combine private and public data. </a:t>
+              <a:t>Large Language Models allow to replace mundane text generation with automation. This can lead to reduction in labour expenses and increase in profitability.</a:t>
             </a:r>
             <a:endParaRPr b="0" lang="en-AU" sz="2000" strike="noStrike" u="none">
               <a:solidFill>
@@ -2788,7 +2489,7 @@
                 <a:uFillTx/>
                 <a:latin typeface="Arial"/>
               </a:rPr>
-              <a:t>Private data is collected from penetration test reports conducted on the enterprise network and applications. Results recorded in the reports are confidential to the organisation.</a:t>
+              <a:t>Incorporating LLMs require changes in business process.</a:t>
             </a:r>
             <a:endParaRPr b="0" lang="en-AU" sz="2000" strike="noStrike" u="none">
               <a:solidFill>
@@ -2837,7 +2538,105 @@
                 <a:uFillTx/>
                 <a:latin typeface="Arial"/>
               </a:rPr>
-              <a:t>Public data is the PCI DSS standard. This standard is a part of public domain. As a result, generally available LLMs are trained on this document.</a:t>
+              <a:t>Every company have access to LLMs trained on public data. Therefore, the knowledge of public data is not a competitive advantage. Only private data gives advantage.</a:t>
+            </a:r>
+            <a:endParaRPr b="0" lang="en-AU" sz="2000" strike="noStrike" u="none">
+              <a:solidFill>
+                <a:srgbClr val="000000"/>
+              </a:solidFill>
+              <a:effectLst/>
+              <a:uFillTx/>
+              <a:latin typeface="Arial"/>
+            </a:endParaRPr>
+          </a:p>
+          <a:p>
+            <a:pPr indent="0">
+              <a:lnSpc>
+                <a:spcPct val="100000"/>
+              </a:lnSpc>
+              <a:buNone/>
+              <a:tabLst>
+                <a:tab algn="l" pos="0"/>
+              </a:tabLst>
+            </a:pPr>
+            <a:endParaRPr b="0" lang="en-AU" sz="2000" strike="noStrike" u="none">
+              <a:solidFill>
+                <a:srgbClr val="000000"/>
+              </a:solidFill>
+              <a:effectLst/>
+              <a:uFillTx/>
+              <a:latin typeface="Arial"/>
+            </a:endParaRPr>
+          </a:p>
+          <a:p>
+            <a:pPr indent="0">
+              <a:lnSpc>
+                <a:spcPct val="100000"/>
+              </a:lnSpc>
+              <a:buNone/>
+              <a:tabLst>
+                <a:tab algn="l" pos="0"/>
+              </a:tabLst>
+            </a:pPr>
+            <a:r>
+              <a:rPr b="0" lang="en-AU" sz="2000" strike="noStrike" u="none">
+                <a:solidFill>
+                  <a:srgbClr val="000000"/>
+                </a:solidFill>
+                <a:effectLst/>
+                <a:uFillTx/>
+                <a:latin typeface="Arial"/>
+              </a:rPr>
+              <a:t>Investing in LLM workflows should focus on using private data. This gives biggest advantage.</a:t>
+            </a:r>
+            <a:endParaRPr b="0" lang="en-AU" sz="2000" strike="noStrike" u="none">
+              <a:solidFill>
+                <a:srgbClr val="000000"/>
+              </a:solidFill>
+              <a:effectLst/>
+              <a:uFillTx/>
+              <a:latin typeface="Arial"/>
+            </a:endParaRPr>
+          </a:p>
+          <a:p>
+            <a:pPr indent="0">
+              <a:lnSpc>
+                <a:spcPct val="100000"/>
+              </a:lnSpc>
+              <a:buNone/>
+              <a:tabLst>
+                <a:tab algn="l" pos="0"/>
+              </a:tabLst>
+            </a:pPr>
+            <a:endParaRPr b="0" lang="en-AU" sz="2000" strike="noStrike" u="none">
+              <a:solidFill>
+                <a:srgbClr val="000000"/>
+              </a:solidFill>
+              <a:effectLst/>
+              <a:uFillTx/>
+              <a:latin typeface="Arial"/>
+            </a:endParaRPr>
+          </a:p>
+          <a:p>
+            <a:pPr indent="0">
+              <a:lnSpc>
+                <a:spcPct val="100000"/>
+              </a:lnSpc>
+              <a:buNone/>
+              <a:tabLst>
+                <a:tab algn="l" pos="0"/>
+              </a:tabLst>
+            </a:pPr>
+            <a:r>
+              <a:rPr b="0" lang="en-AU" sz="2000" strike="noStrike" u="none">
+                <a:solidFill>
+                  <a:srgbClr val="000000"/>
+                </a:solidFill>
+                <a:effectLst/>
+                <a:uFillTx/>
+                <a:latin typeface="Arial"/>
+              </a:rPr>
+              <a:t>More context – what we try to automate. – context of security work</a:t>
             </a:r>
             <a:endParaRPr b="0" lang="en-AU" sz="2000" strike="noStrike" u="none">
               <a:solidFill>
@@ -2855,7 +2654,402 @@
 </p:notes>
 </file>
 
-<file path=ppt/notesSlides/notesSlide4.xml><?xml version="1.0" encoding="utf-8"?>
+<file path=ppt/notesSlides/notesSlide20.xml><?xml version="1.0" encoding="utf-8"?>
+<p:notes xmlns:a="http://schemas.openxmlformats.org/drawingml/2006/main" xmlns:p="http://schemas.openxmlformats.org/presentationml/2006/main" xmlns:r="http://schemas.openxmlformats.org/officeDocument/2006/relationships" xmlns:p14="http://schemas.microsoft.com/office/powerpoint/2010/main" xmlns:p15="http://schemas.microsoft.com/office/powerpoint/2012/main" xmlns:mc="http://schemas.openxmlformats.org/markup-compatibility/2006">
+  <p:cSld>
+    <p:spTree>
+      <p:nvGrpSpPr>
+        <p:cNvPr id="1" name=""/>
+        <p:cNvGrpSpPr/>
+        <p:nvPr/>
+      </p:nvGrpSpPr>
+      <p:grpSpPr>
+        <a:xfrm>
+          <a:off x="0" y="0"/>
+          <a:ext cx="0" cy="0"/>
+          <a:chOff x="0" y="0"/>
+          <a:chExt cx="0" cy="0"/>
+        </a:xfrm>
+      </p:grpSpPr>
+      <p:sp>
+        <p:nvSpPr>
+          <p:cNvPr id="105" name="PlaceHolder 1"/>
+          <p:cNvSpPr>
+            <a:spLocks noGrp="1"/>
+          </p:cNvSpPr>
+          <p:nvPr>
+            <p:ph type="sldImg"/>
+          </p:nvPr>
+        </p:nvSpPr>
+        <p:spPr>
+          <a:xfrm>
+            <a:off x="216000" y="812520"/>
+            <a:ext cx="7126560" cy="4008240"/>
+          </a:xfrm>
+          <a:prstGeom prst="rect">
+            <a:avLst/>
+          </a:prstGeom>
+          <a:ln w="0">
+            <a:noFill/>
+          </a:ln>
+        </p:spPr>
+      </p:sp>
+      <p:sp>
+        <p:nvSpPr>
+          <p:cNvPr id="106" name="PlaceHolder 2"/>
+          <p:cNvSpPr>
+            <a:spLocks noGrp="1"/>
+          </p:cNvSpPr>
+          <p:nvPr>
+            <p:ph type="body"/>
+          </p:nvPr>
+        </p:nvSpPr>
+        <p:spPr>
+          <a:xfrm>
+            <a:off x="756000" y="5078520"/>
+            <a:ext cx="6046920" cy="4810320"/>
+          </a:xfrm>
+          <a:prstGeom prst="rect">
+            <a:avLst/>
+          </a:prstGeom>
+          <a:noFill/>
+          <a:ln w="0">
+            <a:noFill/>
+          </a:ln>
+        </p:spPr>
+        <p:txBody>
+          <a:bodyPr lIns="0" rIns="0" tIns="0" bIns="0" anchor="t">
+            <a:noAutofit/>
+          </a:bodyPr>
+          <a:p>
+            <a:pPr indent="0">
+              <a:lnSpc>
+                <a:spcPct val="100000"/>
+              </a:lnSpc>
+              <a:buNone/>
+              <a:tabLst>
+                <a:tab algn="l" pos="0"/>
+              </a:tabLst>
+            </a:pPr>
+            <a:r>
+              <a:rPr b="0" lang="en-AU" sz="2000" strike="noStrike" u="none">
+                <a:solidFill>
+                  <a:srgbClr val="000000"/>
+                </a:solidFill>
+                <a:effectLst/>
+                <a:uFillTx/>
+                <a:latin typeface="Arial"/>
+              </a:rPr>
+              <a:t>An example of semantic search results that illustrate the challenge of data retrieval:</a:t>
+            </a:r>
+            <a:endParaRPr b="0" lang="en-AU" sz="2000" strike="noStrike" u="none">
+              <a:solidFill>
+                <a:srgbClr val="000000"/>
+              </a:solidFill>
+              <a:effectLst/>
+              <a:uFillTx/>
+              <a:latin typeface="Arial"/>
+            </a:endParaRPr>
+          </a:p>
+          <a:p>
+            <a:pPr indent="0">
+              <a:lnSpc>
+                <a:spcPct val="100000"/>
+              </a:lnSpc>
+              <a:buNone/>
+              <a:tabLst>
+                <a:tab algn="l" pos="0"/>
+              </a:tabLst>
+            </a:pPr>
+            <a:endParaRPr b="0" lang="en-AU" sz="2000" strike="noStrike" u="none">
+              <a:solidFill>
+                <a:srgbClr val="000000"/>
+              </a:solidFill>
+              <a:effectLst/>
+              <a:uFillTx/>
+              <a:latin typeface="Arial"/>
+            </a:endParaRPr>
+          </a:p>
+          <a:p>
+            <a:pPr indent="0">
+              <a:lnSpc>
+                <a:spcPct val="100000"/>
+              </a:lnSpc>
+              <a:buNone/>
+              <a:tabLst>
+                <a:tab algn="l" pos="0"/>
+              </a:tabLst>
+            </a:pPr>
+            <a:r>
+              <a:rPr b="0" lang="en-AU" sz="2000" strike="noStrike" u="none">
+                <a:solidFill>
+                  <a:srgbClr val="000000"/>
+                </a:solidFill>
+                <a:effectLst/>
+                <a:uFillTx/>
+                <a:latin typeface="Arial"/>
+              </a:rPr>
+              <a:t>- The intent of the query was to retrieve all issues describing XSS vulnerabilities in the software.</a:t>
+            </a:r>
+            <a:endParaRPr b="0" lang="en-AU" sz="2000" strike="noStrike" u="none">
+              <a:solidFill>
+                <a:srgbClr val="000000"/>
+              </a:solidFill>
+              <a:effectLst/>
+              <a:uFillTx/>
+              <a:latin typeface="Arial"/>
+            </a:endParaRPr>
+          </a:p>
+          <a:p>
+            <a:pPr indent="0">
+              <a:lnSpc>
+                <a:spcPct val="100000"/>
+              </a:lnSpc>
+              <a:buNone/>
+              <a:tabLst>
+                <a:tab algn="l" pos="0"/>
+              </a:tabLst>
+            </a:pPr>
+            <a:endParaRPr b="0" lang="en-AU" sz="2000" strike="noStrike" u="none">
+              <a:solidFill>
+                <a:srgbClr val="000000"/>
+              </a:solidFill>
+              <a:effectLst/>
+              <a:uFillTx/>
+              <a:latin typeface="Arial"/>
+            </a:endParaRPr>
+          </a:p>
+          <a:p>
+            <a:pPr indent="0">
+              <a:lnSpc>
+                <a:spcPct val="100000"/>
+              </a:lnSpc>
+              <a:buNone/>
+              <a:tabLst>
+                <a:tab algn="l" pos="0"/>
+              </a:tabLst>
+            </a:pPr>
+            <a:r>
+              <a:rPr b="0" lang="en-AU" sz="2000" strike="noStrike" u="none">
+                <a:solidFill>
+                  <a:srgbClr val="000000"/>
+                </a:solidFill>
+                <a:effectLst/>
+                <a:uFillTx/>
+                <a:latin typeface="Arial"/>
+              </a:rPr>
+              <a:t>- The item retrieved by semantic search described potential XSS vulnerability in a third-party application “Jenkins”.</a:t>
+            </a:r>
+            <a:endParaRPr b="0" lang="en-AU" sz="2000" strike="noStrike" u="none">
+              <a:solidFill>
+                <a:srgbClr val="000000"/>
+              </a:solidFill>
+              <a:effectLst/>
+              <a:uFillTx/>
+              <a:latin typeface="Arial"/>
+            </a:endParaRPr>
+          </a:p>
+          <a:p>
+            <a:pPr indent="0">
+              <a:lnSpc>
+                <a:spcPct val="100000"/>
+              </a:lnSpc>
+              <a:buNone/>
+              <a:tabLst>
+                <a:tab algn="l" pos="0"/>
+              </a:tabLst>
+            </a:pPr>
+            <a:endParaRPr b="0" lang="en-AU" sz="2000" strike="noStrike" u="none">
+              <a:solidFill>
+                <a:srgbClr val="000000"/>
+              </a:solidFill>
+              <a:effectLst/>
+              <a:uFillTx/>
+              <a:latin typeface="Arial"/>
+            </a:endParaRPr>
+          </a:p>
+          <a:p>
+            <a:pPr indent="0">
+              <a:lnSpc>
+                <a:spcPct val="100000"/>
+              </a:lnSpc>
+              <a:buNone/>
+              <a:tabLst>
+                <a:tab algn="l" pos="0"/>
+              </a:tabLst>
+            </a:pPr>
+            <a:r>
+              <a:rPr b="0" lang="en-AU" sz="2000" strike="noStrike" u="none">
+                <a:solidFill>
+                  <a:srgbClr val="000000"/>
+                </a:solidFill>
+                <a:effectLst/>
+                <a:uFillTx/>
+                <a:latin typeface="Arial"/>
+              </a:rPr>
+              <a:t>- From the point of view of LLM, the answer matches the query. There is an XSS issue in Jenkins. Job well done.</a:t>
+            </a:r>
+            <a:endParaRPr b="0" lang="en-AU" sz="2000" strike="noStrike" u="none">
+              <a:solidFill>
+                <a:srgbClr val="000000"/>
+              </a:solidFill>
+              <a:effectLst/>
+              <a:uFillTx/>
+              <a:latin typeface="Arial"/>
+            </a:endParaRPr>
+          </a:p>
+          <a:p>
+            <a:pPr indent="0">
+              <a:lnSpc>
+                <a:spcPct val="100000"/>
+              </a:lnSpc>
+              <a:buNone/>
+              <a:tabLst>
+                <a:tab algn="l" pos="0"/>
+              </a:tabLst>
+            </a:pPr>
+            <a:endParaRPr b="0" lang="en-AU" sz="2000" strike="noStrike" u="none">
+              <a:solidFill>
+                <a:srgbClr val="000000"/>
+              </a:solidFill>
+              <a:effectLst/>
+              <a:uFillTx/>
+              <a:latin typeface="Arial"/>
+            </a:endParaRPr>
+          </a:p>
+          <a:p>
+            <a:pPr indent="0">
+              <a:lnSpc>
+                <a:spcPct val="100000"/>
+              </a:lnSpc>
+              <a:buNone/>
+              <a:tabLst>
+                <a:tab algn="l" pos="0"/>
+              </a:tabLst>
+            </a:pPr>
+            <a:r>
+              <a:rPr b="0" lang="en-AU" sz="2000" strike="noStrike" u="none">
+                <a:solidFill>
+                  <a:srgbClr val="000000"/>
+                </a:solidFill>
+                <a:effectLst/>
+                <a:uFillTx/>
+                <a:latin typeface="Arial"/>
+              </a:rPr>
+              <a:t>- From the point of view of the user, this answer is likely incorrect. The information about third-party XSS issue is not relevant to enterprise software developer. </a:t>
+            </a:r>
+            <a:endParaRPr b="0" lang="en-AU" sz="2000" strike="noStrike" u="none">
+              <a:solidFill>
+                <a:srgbClr val="000000"/>
+              </a:solidFill>
+              <a:effectLst/>
+              <a:uFillTx/>
+              <a:latin typeface="Arial"/>
+            </a:endParaRPr>
+          </a:p>
+          <a:p>
+            <a:pPr indent="0">
+              <a:lnSpc>
+                <a:spcPct val="100000"/>
+              </a:lnSpc>
+              <a:buNone/>
+              <a:tabLst>
+                <a:tab algn="l" pos="0"/>
+              </a:tabLst>
+            </a:pPr>
+            <a:endParaRPr b="0" lang="en-AU" sz="2000" strike="noStrike" u="none">
+              <a:solidFill>
+                <a:srgbClr val="000000"/>
+              </a:solidFill>
+              <a:effectLst/>
+              <a:uFillTx/>
+              <a:latin typeface="Arial"/>
+            </a:endParaRPr>
+          </a:p>
+          <a:p>
+            <a:pPr indent="0">
+              <a:lnSpc>
+                <a:spcPct val="100000"/>
+              </a:lnSpc>
+              <a:buNone/>
+              <a:tabLst>
+                <a:tab algn="l" pos="0"/>
+              </a:tabLst>
+            </a:pPr>
+            <a:endParaRPr b="0" lang="en-AU" sz="2000" strike="noStrike" u="none">
+              <a:solidFill>
+                <a:srgbClr val="000000"/>
+              </a:solidFill>
+              <a:effectLst/>
+              <a:uFillTx/>
+              <a:latin typeface="Arial"/>
+            </a:endParaRPr>
+          </a:p>
+          <a:p>
+            <a:pPr indent="0">
+              <a:lnSpc>
+                <a:spcPct val="100000"/>
+              </a:lnSpc>
+              <a:buNone/>
+              <a:tabLst>
+                <a:tab algn="l" pos="0"/>
+              </a:tabLst>
+            </a:pPr>
+            <a:endParaRPr b="0" lang="en-AU" sz="2000" strike="noStrike" u="none">
+              <a:solidFill>
+                <a:srgbClr val="000000"/>
+              </a:solidFill>
+              <a:effectLst/>
+              <a:uFillTx/>
+              <a:latin typeface="Arial"/>
+            </a:endParaRPr>
+          </a:p>
+          <a:p>
+            <a:pPr indent="0">
+              <a:lnSpc>
+                <a:spcPct val="100000"/>
+              </a:lnSpc>
+              <a:buNone/>
+              <a:tabLst>
+                <a:tab algn="l" pos="0"/>
+              </a:tabLst>
+            </a:pPr>
+            <a:endParaRPr b="0" lang="en-AU" sz="2000" strike="noStrike" u="none">
+              <a:solidFill>
+                <a:srgbClr val="000000"/>
+              </a:solidFill>
+              <a:effectLst/>
+              <a:uFillTx/>
+              <a:latin typeface="Arial"/>
+            </a:endParaRPr>
+          </a:p>
+          <a:p>
+            <a:pPr indent="0">
+              <a:lnSpc>
+                <a:spcPct val="100000"/>
+              </a:lnSpc>
+              <a:buNone/>
+              <a:tabLst>
+                <a:tab algn="l" pos="0"/>
+              </a:tabLst>
+            </a:pPr>
+            <a:endParaRPr b="0" lang="en-AU" sz="2000" strike="noStrike" u="none">
+              <a:solidFill>
+                <a:srgbClr val="000000"/>
+              </a:solidFill>
+              <a:effectLst/>
+              <a:uFillTx/>
+              <a:latin typeface="Arial"/>
+            </a:endParaRPr>
+          </a:p>
+        </p:txBody>
+      </p:sp>
+    </p:spTree>
+  </p:cSld>
+</p:notes>
+</file>
+
+<file path=ppt/notesSlides/notesSlide3.xml><?xml version="1.0" encoding="utf-8"?>
 <p:notes xmlns:a="http://schemas.openxmlformats.org/drawingml/2006/main" xmlns:p="http://schemas.openxmlformats.org/presentationml/2006/main" xmlns:r="http://schemas.openxmlformats.org/officeDocument/2006/relationships" xmlns:p14="http://schemas.microsoft.com/office/powerpoint/2010/main" xmlns:p15="http://schemas.microsoft.com/office/powerpoint/2012/main" xmlns:mc="http://schemas.openxmlformats.org/markup-compatibility/2006">
   <p:cSld>
     <p:spTree>
@@ -2885,7 +3079,7 @@
         <p:spPr>
           <a:xfrm>
             <a:off x="216000" y="812520"/>
-            <a:ext cx="7126920" cy="4008600"/>
+            <a:ext cx="7126560" cy="4008240"/>
           </a:xfrm>
           <a:prstGeom prst="rect">
             <a:avLst/>
@@ -2908,7 +3102,7 @@
         <p:spPr>
           <a:xfrm>
             <a:off x="756000" y="5078520"/>
-            <a:ext cx="6047280" cy="4810680"/>
+            <a:ext cx="6046920" cy="4810320"/>
           </a:xfrm>
           <a:prstGeom prst="rect">
             <a:avLst/>
@@ -2941,7 +3135,7 @@
                 <a:uFillTx/>
                 <a:latin typeface="Arial"/>
               </a:rPr>
-              <a:t>When the company decides to use LLM in business, it should decide how to incorporate private data in the machine.</a:t>
+              <a:t>In the example application we combine private and public data. </a:t>
             </a:r>
             <a:endParaRPr b="0" lang="en-AU" sz="2000" strike="noStrike" u="none">
               <a:solidFill>
@@ -2990,7 +3184,56 @@
                 <a:uFillTx/>
                 <a:latin typeface="Arial"/>
               </a:rPr>
-              <a:t>We will briefly describe the methods to deliver private data in the machine.</a:t>
+              <a:t>Private data is collected from penetration test reports conducted on the enterprise network and applications. Results recorded in the reports are confidential to the organisation.</a:t>
+            </a:r>
+            <a:endParaRPr b="0" lang="en-AU" sz="2000" strike="noStrike" u="none">
+              <a:solidFill>
+                <a:srgbClr val="000000"/>
+              </a:solidFill>
+              <a:effectLst/>
+              <a:uFillTx/>
+              <a:latin typeface="Arial"/>
+            </a:endParaRPr>
+          </a:p>
+          <a:p>
+            <a:pPr indent="0">
+              <a:lnSpc>
+                <a:spcPct val="100000"/>
+              </a:lnSpc>
+              <a:buNone/>
+              <a:tabLst>
+                <a:tab algn="l" pos="0"/>
+              </a:tabLst>
+            </a:pPr>
+            <a:endParaRPr b="0" lang="en-AU" sz="2000" strike="noStrike" u="none">
+              <a:solidFill>
+                <a:srgbClr val="000000"/>
+              </a:solidFill>
+              <a:effectLst/>
+              <a:uFillTx/>
+              <a:latin typeface="Arial"/>
+            </a:endParaRPr>
+          </a:p>
+          <a:p>
+            <a:pPr indent="0">
+              <a:lnSpc>
+                <a:spcPct val="100000"/>
+              </a:lnSpc>
+              <a:buNone/>
+              <a:tabLst>
+                <a:tab algn="l" pos="0"/>
+              </a:tabLst>
+            </a:pPr>
+            <a:r>
+              <a:rPr b="0" lang="en-AU" sz="2000" strike="noStrike" u="none">
+                <a:solidFill>
+                  <a:srgbClr val="000000"/>
+                </a:solidFill>
+                <a:effectLst/>
+                <a:uFillTx/>
+                <a:latin typeface="Arial"/>
+              </a:rPr>
+              <a:t>Public data is the PCI DSS standard. This standard is a part of public domain. As a result, generally available LLMs are trained on this document.</a:t>
             </a:r>
             <a:endParaRPr b="0" lang="en-AU" sz="2000" strike="noStrike" u="none">
               <a:solidFill>
@@ -3008,7 +3251,7 @@
 </p:notes>
 </file>
 
-<file path=ppt/notesSlides/notesSlide5.xml><?xml version="1.0" encoding="utf-8"?>
+<file path=ppt/notesSlides/notesSlide4.xml><?xml version="1.0" encoding="utf-8"?>
 <p:notes xmlns:a="http://schemas.openxmlformats.org/drawingml/2006/main" xmlns:p="http://schemas.openxmlformats.org/presentationml/2006/main" xmlns:r="http://schemas.openxmlformats.org/officeDocument/2006/relationships" xmlns:p14="http://schemas.microsoft.com/office/powerpoint/2010/main" xmlns:p15="http://schemas.microsoft.com/office/powerpoint/2012/main" xmlns:mc="http://schemas.openxmlformats.org/markup-compatibility/2006">
   <p:cSld>
     <p:spTree>
@@ -3037,8 +3280,8 @@
         </p:nvSpPr>
         <p:spPr>
           <a:xfrm>
-            <a:off x="216360" y="812520"/>
-            <a:ext cx="7126560" cy="4008600"/>
+            <a:off x="216000" y="812520"/>
+            <a:ext cx="7126560" cy="4008240"/>
           </a:xfrm>
           <a:prstGeom prst="rect">
             <a:avLst/>
@@ -3061,7 +3304,7 @@
         <p:spPr>
           <a:xfrm>
             <a:off x="756000" y="5078520"/>
-            <a:ext cx="6047280" cy="4810680"/>
+            <a:ext cx="6046920" cy="4810320"/>
           </a:xfrm>
           <a:prstGeom prst="rect">
             <a:avLst/>
@@ -3094,7 +3337,7 @@
                 <a:uFillTx/>
                 <a:latin typeface="Arial"/>
               </a:rPr>
-              <a:t>RAG keeps private data separate from the machine in the database.</a:t>
+              <a:t>When the company decides to use LLM in business, it should decide how to incorporate private data in the machine.</a:t>
             </a:r>
             <a:endParaRPr b="0" lang="en-AU" sz="2000" strike="noStrike" u="none">
               <a:solidFill>
@@ -3143,105 +3386,7 @@
                 <a:uFillTx/>
                 <a:latin typeface="Arial"/>
               </a:rPr>
-              <a:t>Such database has to be created and maintained by the organisation.</a:t>
-            </a:r>
-            <a:endParaRPr b="0" lang="en-AU" sz="2000" strike="noStrike" u="none">
-              <a:solidFill>
-                <a:srgbClr val="000000"/>
-              </a:solidFill>
-              <a:effectLst/>
-              <a:uFillTx/>
-              <a:latin typeface="Arial"/>
-            </a:endParaRPr>
-          </a:p>
-          <a:p>
-            <a:pPr indent="0">
-              <a:lnSpc>
-                <a:spcPct val="100000"/>
-              </a:lnSpc>
-              <a:buNone/>
-              <a:tabLst>
-                <a:tab algn="l" pos="0"/>
-              </a:tabLst>
-            </a:pPr>
-            <a:endParaRPr b="0" lang="en-AU" sz="2000" strike="noStrike" u="none">
-              <a:solidFill>
-                <a:srgbClr val="000000"/>
-              </a:solidFill>
-              <a:effectLst/>
-              <a:uFillTx/>
-              <a:latin typeface="Arial"/>
-            </a:endParaRPr>
-          </a:p>
-          <a:p>
-            <a:pPr indent="0">
-              <a:lnSpc>
-                <a:spcPct val="100000"/>
-              </a:lnSpc>
-              <a:buNone/>
-              <a:tabLst>
-                <a:tab algn="l" pos="0"/>
-              </a:tabLst>
-            </a:pPr>
-            <a:r>
-              <a:rPr b="0" lang="en-AU" sz="2000" strike="noStrike" u="none">
-                <a:solidFill>
-                  <a:srgbClr val="000000"/>
-                </a:solidFill>
-                <a:effectLst/>
-                <a:uFillTx/>
-                <a:latin typeface="Arial"/>
-              </a:rPr>
-              <a:t>Part of the example application called Indexer creates and maintains RAG database.</a:t>
-            </a:r>
-            <a:endParaRPr b="0" lang="en-AU" sz="2000" strike="noStrike" u="none">
-              <a:solidFill>
-                <a:srgbClr val="000000"/>
-              </a:solidFill>
-              <a:effectLst/>
-              <a:uFillTx/>
-              <a:latin typeface="Arial"/>
-            </a:endParaRPr>
-          </a:p>
-          <a:p>
-            <a:pPr indent="0">
-              <a:lnSpc>
-                <a:spcPct val="100000"/>
-              </a:lnSpc>
-              <a:buNone/>
-              <a:tabLst>
-                <a:tab algn="l" pos="0"/>
-              </a:tabLst>
-            </a:pPr>
-            <a:endParaRPr b="0" lang="en-AU" sz="2000" strike="noStrike" u="none">
-              <a:solidFill>
-                <a:srgbClr val="000000"/>
-              </a:solidFill>
-              <a:effectLst/>
-              <a:uFillTx/>
-              <a:latin typeface="Arial"/>
-            </a:endParaRPr>
-          </a:p>
-          <a:p>
-            <a:pPr indent="0">
-              <a:lnSpc>
-                <a:spcPct val="100000"/>
-              </a:lnSpc>
-              <a:buNone/>
-              <a:tabLst>
-                <a:tab algn="l" pos="0"/>
-              </a:tabLst>
-            </a:pPr>
-            <a:r>
-              <a:rPr b="0" lang="en-AU" sz="2000" strike="noStrike" u="none">
-                <a:solidFill>
-                  <a:srgbClr val="000000"/>
-                </a:solidFill>
-                <a:effectLst/>
-                <a:uFillTx/>
-                <a:latin typeface="Arial"/>
-              </a:rPr>
-              <a:t>Note that the steps required to created RAG solution can be reused in Tuning solution. </a:t>
+              <a:t>We will briefly describe the methods to deliver private data in the machine.</a:t>
             </a:r>
             <a:endParaRPr b="0" lang="en-AU" sz="2000" strike="noStrike" u="none">
               <a:solidFill>
@@ -3259,7 +3404,7 @@
 </p:notes>
 </file>
 
-<file path=ppt/notesSlides/notesSlide6.xml><?xml version="1.0" encoding="utf-8"?>
+<file path=ppt/notesSlides/notesSlide5.xml><?xml version="1.0" encoding="utf-8"?>
 <p:notes xmlns:a="http://schemas.openxmlformats.org/drawingml/2006/main" xmlns:p="http://schemas.openxmlformats.org/presentationml/2006/main" xmlns:r="http://schemas.openxmlformats.org/officeDocument/2006/relationships" xmlns:p14="http://schemas.microsoft.com/office/powerpoint/2010/main" xmlns:p15="http://schemas.microsoft.com/office/powerpoint/2012/main" xmlns:mc="http://schemas.openxmlformats.org/markup-compatibility/2006">
   <p:cSld>
     <p:spTree>
@@ -3289,7 +3434,7 @@
         <p:spPr>
           <a:xfrm>
             <a:off x="216360" y="812520"/>
-            <a:ext cx="7126560" cy="4008600"/>
+            <a:ext cx="7126200" cy="4008240"/>
           </a:xfrm>
           <a:prstGeom prst="rect">
             <a:avLst/>
@@ -3312,7 +3457,7 @@
         <p:spPr>
           <a:xfrm>
             <a:off x="756000" y="5078520"/>
-            <a:ext cx="6047280" cy="4810680"/>
+            <a:ext cx="6046920" cy="4810320"/>
           </a:xfrm>
           <a:prstGeom prst="rect">
             <a:avLst/>
@@ -3345,7 +3490,7 @@
                 <a:uFillTx/>
                 <a:latin typeface="Arial"/>
               </a:rPr>
-              <a:t>Tuning process incorporates private data into LLM decision making. </a:t>
+              <a:t>RAG keeps private data separate from the machine in the database.</a:t>
             </a:r>
             <a:endParaRPr b="0" lang="en-AU" sz="2000" strike="noStrike" u="none">
               <a:solidFill>
@@ -3394,7 +3539,7 @@
                 <a:uFillTx/>
                 <a:latin typeface="Arial"/>
               </a:rPr>
-              <a:t>This method depends on the quality of data supplied.</a:t>
+              <a:t>Such database has to be created and maintained by the organisation.</a:t>
             </a:r>
             <a:endParaRPr b="0" lang="en-AU" sz="2000" strike="noStrike" u="none">
               <a:solidFill>
@@ -3443,7 +3588,56 @@
                 <a:uFillTx/>
                 <a:latin typeface="Arial"/>
               </a:rPr>
-              <a:t>Note that RAG solution can be used to verify quality of data before deployment of Tuning solution. </a:t>
+              <a:t>Part of the example application called Indexer creates and maintains RAG database.</a:t>
+            </a:r>
+            <a:endParaRPr b="0" lang="en-AU" sz="2000" strike="noStrike" u="none">
+              <a:solidFill>
+                <a:srgbClr val="000000"/>
+              </a:solidFill>
+              <a:effectLst/>
+              <a:uFillTx/>
+              <a:latin typeface="Arial"/>
+            </a:endParaRPr>
+          </a:p>
+          <a:p>
+            <a:pPr indent="0">
+              <a:lnSpc>
+                <a:spcPct val="100000"/>
+              </a:lnSpc>
+              <a:buNone/>
+              <a:tabLst>
+                <a:tab algn="l" pos="0"/>
+              </a:tabLst>
+            </a:pPr>
+            <a:endParaRPr b="0" lang="en-AU" sz="2000" strike="noStrike" u="none">
+              <a:solidFill>
+                <a:srgbClr val="000000"/>
+              </a:solidFill>
+              <a:effectLst/>
+              <a:uFillTx/>
+              <a:latin typeface="Arial"/>
+            </a:endParaRPr>
+          </a:p>
+          <a:p>
+            <a:pPr indent="0">
+              <a:lnSpc>
+                <a:spcPct val="100000"/>
+              </a:lnSpc>
+              <a:buNone/>
+              <a:tabLst>
+                <a:tab algn="l" pos="0"/>
+              </a:tabLst>
+            </a:pPr>
+            <a:r>
+              <a:rPr b="0" lang="en-AU" sz="2000" strike="noStrike" u="none">
+                <a:solidFill>
+                  <a:srgbClr val="000000"/>
+                </a:solidFill>
+                <a:effectLst/>
+                <a:uFillTx/>
+                <a:latin typeface="Arial"/>
+              </a:rPr>
+              <a:t>Note that the steps required to created RAG solution can be reused in Tuning solution. </a:t>
             </a:r>
             <a:endParaRPr b="0" lang="en-AU" sz="2000" strike="noStrike" u="none">
               <a:solidFill>
@@ -3461,7 +3655,7 @@
 </p:notes>
 </file>
 
-<file path=ppt/notesSlides/notesSlide7.xml><?xml version="1.0" encoding="utf-8"?>
+<file path=ppt/notesSlides/notesSlide6.xml><?xml version="1.0" encoding="utf-8"?>
 <p:notes xmlns:a="http://schemas.openxmlformats.org/drawingml/2006/main" xmlns:p="http://schemas.openxmlformats.org/presentationml/2006/main" xmlns:r="http://schemas.openxmlformats.org/officeDocument/2006/relationships" xmlns:p14="http://schemas.microsoft.com/office/powerpoint/2010/main" xmlns:p15="http://schemas.microsoft.com/office/powerpoint/2012/main" xmlns:mc="http://schemas.openxmlformats.org/markup-compatibility/2006">
   <p:cSld>
     <p:spTree>
@@ -3491,7 +3685,7 @@
         <p:spPr>
           <a:xfrm>
             <a:off x="216360" y="812520"/>
-            <a:ext cx="7126560" cy="4008600"/>
+            <a:ext cx="7126200" cy="4008240"/>
           </a:xfrm>
           <a:prstGeom prst="rect">
             <a:avLst/>
@@ -3514,7 +3708,7 @@
         <p:spPr>
           <a:xfrm>
             <a:off x="756000" y="5078520"/>
-            <a:ext cx="6047280" cy="4810680"/>
+            <a:ext cx="6046920" cy="4810320"/>
           </a:xfrm>
           <a:prstGeom prst="rect">
             <a:avLst/>
@@ -3547,7 +3741,7 @@
                 <a:uFillTx/>
                 <a:latin typeface="Arial"/>
               </a:rPr>
-              <a:t>We believe that organisations entering ML can benefit from gradual introduction.</a:t>
+              <a:t>Tuning process incorporates private data into LLM decision making. </a:t>
             </a:r>
             <a:endParaRPr b="0" lang="en-AU" sz="2000" strike="noStrike" u="none">
               <a:solidFill>
@@ -3596,7 +3790,7 @@
                 <a:uFillTx/>
                 <a:latin typeface="Arial"/>
               </a:rPr>
-              <a:t>RAG allows to introduce ML at a cost lower that Tuning.</a:t>
+              <a:t>This method depends on the quality of data supplied.</a:t>
             </a:r>
             <a:endParaRPr b="0" lang="en-AU" sz="2000" strike="noStrike" u="none">
               <a:solidFill>
@@ -3617,6 +3811,36 @@
                 <a:tab algn="l" pos="0"/>
               </a:tabLst>
             </a:pPr>
+            <a:endParaRPr b="0" lang="en-AU" sz="2000" strike="noStrike" u="none">
+              <a:solidFill>
+                <a:srgbClr val="000000"/>
+              </a:solidFill>
+              <a:effectLst/>
+              <a:uFillTx/>
+              <a:latin typeface="Arial"/>
+            </a:endParaRPr>
+          </a:p>
+          <a:p>
+            <a:pPr indent="0">
+              <a:lnSpc>
+                <a:spcPct val="100000"/>
+              </a:lnSpc>
+              <a:buNone/>
+              <a:tabLst>
+                <a:tab algn="l" pos="0"/>
+              </a:tabLst>
+            </a:pPr>
+            <a:r>
+              <a:rPr b="0" lang="en-AU" sz="2000" strike="noStrike" u="none">
+                <a:solidFill>
+                  <a:srgbClr val="000000"/>
+                </a:solidFill>
+                <a:effectLst/>
+                <a:uFillTx/>
+                <a:latin typeface="Arial"/>
+              </a:rPr>
+              <a:t>Note that RAG solution can be used to verify quality of data before deployment of Tuning solution. </a:t>
+            </a:r>
             <a:endParaRPr b="0" lang="en-AU" sz="2000" strike="noStrike" u="none">
               <a:solidFill>
                 <a:srgbClr val="000000"/>
@@ -3633,7 +3857,7 @@
 </p:notes>
 </file>
 
-<file path=ppt/notesSlides/notesSlide8.xml><?xml version="1.0" encoding="utf-8"?>
+<file path=ppt/notesSlides/notesSlide7.xml><?xml version="1.0" encoding="utf-8"?>
 <p:notes xmlns:a="http://schemas.openxmlformats.org/drawingml/2006/main" xmlns:p="http://schemas.openxmlformats.org/presentationml/2006/main" xmlns:r="http://schemas.openxmlformats.org/officeDocument/2006/relationships" xmlns:p14="http://schemas.microsoft.com/office/powerpoint/2010/main" xmlns:p15="http://schemas.microsoft.com/office/powerpoint/2012/main" xmlns:mc="http://schemas.openxmlformats.org/markup-compatibility/2006">
   <p:cSld>
     <p:spTree>
@@ -3663,7 +3887,7 @@
         <p:spPr>
           <a:xfrm>
             <a:off x="216360" y="812520"/>
-            <a:ext cx="7126560" cy="4008600"/>
+            <a:ext cx="7126200" cy="4008240"/>
           </a:xfrm>
           <a:prstGeom prst="rect">
             <a:avLst/>
@@ -3686,7 +3910,7 @@
         <p:spPr>
           <a:xfrm>
             <a:off x="756000" y="5078520"/>
-            <a:ext cx="6047280" cy="4810680"/>
+            <a:ext cx="6046920" cy="4810320"/>
           </a:xfrm>
           <a:prstGeom prst="rect">
             <a:avLst/>
@@ -3719,7 +3943,7 @@
                 <a:uFillTx/>
                 <a:latin typeface="Arial"/>
               </a:rPr>
-              <a:t>We use Pydantic development library to create our ML applications.</a:t>
+              <a:t>We believe that organisations entering ML can benefit from gradual introduction.</a:t>
             </a:r>
             <a:endParaRPr b="0" lang="en-AU" sz="2000" strike="noStrike" u="none">
               <a:solidFill>
@@ -3768,7 +3992,7 @@
                 <a:uFillTx/>
                 <a:latin typeface="Arial"/>
               </a:rPr>
-              <a:t>We believe that Pydantic provides the balance of features and portability across major ML platforms.</a:t>
+              <a:t>RAG allows to introduce ML at a cost lower that Tuning.</a:t>
             </a:r>
             <a:endParaRPr b="0" lang="en-AU" sz="2000" strike="noStrike" u="none">
               <a:solidFill>
@@ -3789,36 +4013,6 @@
                 <a:tab algn="l" pos="0"/>
               </a:tabLst>
             </a:pPr>
-            <a:endParaRPr b="0" lang="en-AU" sz="2000" strike="noStrike" u="none">
-              <a:solidFill>
-                <a:srgbClr val="000000"/>
-              </a:solidFill>
-              <a:effectLst/>
-              <a:uFillTx/>
-              <a:latin typeface="Arial"/>
-            </a:endParaRPr>
-          </a:p>
-          <a:p>
-            <a:pPr indent="0">
-              <a:lnSpc>
-                <a:spcPct val="100000"/>
-              </a:lnSpc>
-              <a:buNone/>
-              <a:tabLst>
-                <a:tab algn="l" pos="0"/>
-              </a:tabLst>
-            </a:pPr>
-            <a:r>
-              <a:rPr b="0" lang="en-AU" sz="2000" strike="noStrike" u="none">
-                <a:solidFill>
-                  <a:srgbClr val="000000"/>
-                </a:solidFill>
-                <a:effectLst/>
-                <a:uFillTx/>
-                <a:latin typeface="Arial"/>
-              </a:rPr>
-              <a:t>Investing in Pydantic Agent solution reduces the risk of obsolete technology.</a:t>
-            </a:r>
             <a:endParaRPr b="0" lang="en-AU" sz="2000" strike="noStrike" u="none">
               <a:solidFill>
                 <a:srgbClr val="000000"/>
@@ -3835,7 +4029,7 @@
 </p:notes>
 </file>
 
-<file path=ppt/notesSlides/notesSlide9.xml><?xml version="1.0" encoding="utf-8"?>
+<file path=ppt/notesSlides/notesSlide8.xml><?xml version="1.0" encoding="utf-8"?>
 <p:notes xmlns:a="http://schemas.openxmlformats.org/drawingml/2006/main" xmlns:p="http://schemas.openxmlformats.org/presentationml/2006/main" xmlns:r="http://schemas.openxmlformats.org/officeDocument/2006/relationships" xmlns:p14="http://schemas.microsoft.com/office/powerpoint/2010/main" xmlns:p15="http://schemas.microsoft.com/office/powerpoint/2012/main" xmlns:mc="http://schemas.openxmlformats.org/markup-compatibility/2006">
   <p:cSld>
     <p:spTree>
@@ -3865,7 +4059,7 @@
         <p:spPr>
           <a:xfrm>
             <a:off x="216360" y="812520"/>
-            <a:ext cx="7126560" cy="4008600"/>
+            <a:ext cx="7126200" cy="4008240"/>
           </a:xfrm>
           <a:prstGeom prst="rect">
             <a:avLst/>
@@ -3888,7 +4082,209 @@
         <p:spPr>
           <a:xfrm>
             <a:off x="756000" y="5078520"/>
-            <a:ext cx="6047280" cy="4810680"/>
+            <a:ext cx="6046920" cy="4810320"/>
+          </a:xfrm>
+          <a:prstGeom prst="rect">
+            <a:avLst/>
+          </a:prstGeom>
+          <a:noFill/>
+          <a:ln w="0">
+            <a:noFill/>
+          </a:ln>
+        </p:spPr>
+        <p:txBody>
+          <a:bodyPr lIns="0" rIns="0" tIns="0" bIns="0" anchor="t">
+            <a:noAutofit/>
+          </a:bodyPr>
+          <a:p>
+            <a:pPr indent="0">
+              <a:lnSpc>
+                <a:spcPct val="100000"/>
+              </a:lnSpc>
+              <a:buNone/>
+              <a:tabLst>
+                <a:tab algn="l" pos="0"/>
+              </a:tabLst>
+            </a:pPr>
+            <a:r>
+              <a:rPr b="0" lang="en-AU" sz="2000" strike="noStrike" u="none">
+                <a:solidFill>
+                  <a:srgbClr val="000000"/>
+                </a:solidFill>
+                <a:effectLst/>
+                <a:uFillTx/>
+                <a:latin typeface="Arial"/>
+              </a:rPr>
+              <a:t>We use Pydantic development library to create our ML applications.</a:t>
+            </a:r>
+            <a:endParaRPr b="0" lang="en-AU" sz="2000" strike="noStrike" u="none">
+              <a:solidFill>
+                <a:srgbClr val="000000"/>
+              </a:solidFill>
+              <a:effectLst/>
+              <a:uFillTx/>
+              <a:latin typeface="Arial"/>
+            </a:endParaRPr>
+          </a:p>
+          <a:p>
+            <a:pPr indent="0">
+              <a:lnSpc>
+                <a:spcPct val="100000"/>
+              </a:lnSpc>
+              <a:buNone/>
+              <a:tabLst>
+                <a:tab algn="l" pos="0"/>
+              </a:tabLst>
+            </a:pPr>
+            <a:endParaRPr b="0" lang="en-AU" sz="2000" strike="noStrike" u="none">
+              <a:solidFill>
+                <a:srgbClr val="000000"/>
+              </a:solidFill>
+              <a:effectLst/>
+              <a:uFillTx/>
+              <a:latin typeface="Arial"/>
+            </a:endParaRPr>
+          </a:p>
+          <a:p>
+            <a:pPr indent="0">
+              <a:lnSpc>
+                <a:spcPct val="100000"/>
+              </a:lnSpc>
+              <a:buNone/>
+              <a:tabLst>
+                <a:tab algn="l" pos="0"/>
+              </a:tabLst>
+            </a:pPr>
+            <a:r>
+              <a:rPr b="0" lang="en-AU" sz="2000" strike="noStrike" u="none">
+                <a:solidFill>
+                  <a:srgbClr val="000000"/>
+                </a:solidFill>
+                <a:effectLst/>
+                <a:uFillTx/>
+                <a:latin typeface="Arial"/>
+              </a:rPr>
+              <a:t>We believe that Pydantic provides the balance of features and portability across major ML platforms.</a:t>
+            </a:r>
+            <a:endParaRPr b="0" lang="en-AU" sz="2000" strike="noStrike" u="none">
+              <a:solidFill>
+                <a:srgbClr val="000000"/>
+              </a:solidFill>
+              <a:effectLst/>
+              <a:uFillTx/>
+              <a:latin typeface="Arial"/>
+            </a:endParaRPr>
+          </a:p>
+          <a:p>
+            <a:pPr indent="0">
+              <a:lnSpc>
+                <a:spcPct val="100000"/>
+              </a:lnSpc>
+              <a:buNone/>
+              <a:tabLst>
+                <a:tab algn="l" pos="0"/>
+              </a:tabLst>
+            </a:pPr>
+            <a:endParaRPr b="0" lang="en-AU" sz="2000" strike="noStrike" u="none">
+              <a:solidFill>
+                <a:srgbClr val="000000"/>
+              </a:solidFill>
+              <a:effectLst/>
+              <a:uFillTx/>
+              <a:latin typeface="Arial"/>
+            </a:endParaRPr>
+          </a:p>
+          <a:p>
+            <a:pPr indent="0">
+              <a:lnSpc>
+                <a:spcPct val="100000"/>
+              </a:lnSpc>
+              <a:buNone/>
+              <a:tabLst>
+                <a:tab algn="l" pos="0"/>
+              </a:tabLst>
+            </a:pPr>
+            <a:r>
+              <a:rPr b="0" lang="en-AU" sz="2000" strike="noStrike" u="none">
+                <a:solidFill>
+                  <a:srgbClr val="000000"/>
+                </a:solidFill>
+                <a:effectLst/>
+                <a:uFillTx/>
+                <a:latin typeface="Arial"/>
+              </a:rPr>
+              <a:t>Investing in Pydantic Agent solution reduces the risk of obsolete technology.</a:t>
+            </a:r>
+            <a:endParaRPr b="0" lang="en-AU" sz="2000" strike="noStrike" u="none">
+              <a:solidFill>
+                <a:srgbClr val="000000"/>
+              </a:solidFill>
+              <a:effectLst/>
+              <a:uFillTx/>
+              <a:latin typeface="Arial"/>
+            </a:endParaRPr>
+          </a:p>
+        </p:txBody>
+      </p:sp>
+    </p:spTree>
+  </p:cSld>
+</p:notes>
+</file>
+
+<file path=ppt/notesSlides/notesSlide9.xml><?xml version="1.0" encoding="utf-8"?>
+<p:notes xmlns:a="http://schemas.openxmlformats.org/drawingml/2006/main" xmlns:p="http://schemas.openxmlformats.org/presentationml/2006/main" xmlns:r="http://schemas.openxmlformats.org/officeDocument/2006/relationships" xmlns:p14="http://schemas.microsoft.com/office/powerpoint/2010/main" xmlns:p15="http://schemas.microsoft.com/office/powerpoint/2012/main" xmlns:mc="http://schemas.openxmlformats.org/markup-compatibility/2006">
+  <p:cSld>
+    <p:spTree>
+      <p:nvGrpSpPr>
+        <p:cNvPr id="1" name=""/>
+        <p:cNvGrpSpPr/>
+        <p:nvPr/>
+      </p:nvGrpSpPr>
+      <p:grpSpPr>
+        <a:xfrm>
+          <a:off x="0" y="0"/>
+          <a:ext cx="0" cy="0"/>
+          <a:chOff x="0" y="0"/>
+          <a:chExt cx="0" cy="0"/>
+        </a:xfrm>
+      </p:grpSpPr>
+      <p:sp>
+        <p:nvSpPr>
+          <p:cNvPr id="89" name="PlaceHolder 1"/>
+          <p:cNvSpPr>
+            <a:spLocks noGrp="1"/>
+          </p:cNvSpPr>
+          <p:nvPr>
+            <p:ph type="sldImg"/>
+          </p:nvPr>
+        </p:nvSpPr>
+        <p:spPr>
+          <a:xfrm>
+            <a:off x="216360" y="812520"/>
+            <a:ext cx="7126200" cy="4008240"/>
+          </a:xfrm>
+          <a:prstGeom prst="rect">
+            <a:avLst/>
+          </a:prstGeom>
+          <a:ln w="0">
+            <a:noFill/>
+          </a:ln>
+        </p:spPr>
+      </p:sp>
+      <p:sp>
+        <p:nvSpPr>
+          <p:cNvPr id="90" name="PlaceHolder 2"/>
+          <p:cNvSpPr>
+            <a:spLocks noGrp="1"/>
+          </p:cNvSpPr>
+          <p:nvPr>
+            <p:ph type="body"/>
+          </p:nvPr>
+        </p:nvSpPr>
+        <p:spPr>
+          <a:xfrm>
+            <a:off x="756000" y="5078520"/>
+            <a:ext cx="6046920" cy="4810320"/>
           </a:xfrm>
           <a:prstGeom prst="rect">
             <a:avLst/>
@@ -4112,7 +4508,7 @@
         <p:spPr>
           <a:xfrm flipH="1" flipV="1">
             <a:off x="-2880" y="4497120"/>
-            <a:ext cx="10077480" cy="1167480"/>
+            <a:ext cx="10077120" cy="1167120"/>
           </a:xfrm>
           <a:prstGeom prst="flowChartDocument">
             <a:avLst/>
@@ -4504,7 +4900,7 @@
                 <a:srgbClr val="009bdd"/>
               </a:gs>
             </a:gsLst>
-            <a:lin ang="0"/>
+            <a:lin ang="10800000"/>
           </a:gradFill>
           <a:ln w="18000">
             <a:noFill/>
@@ -4556,7 +4952,7 @@
         <p:spPr>
           <a:xfrm>
             <a:off x="0" y="1620000"/>
-            <a:ext cx="8997480" cy="1077480"/>
+            <a:ext cx="8997120" cy="1077120"/>
           </a:xfrm>
           <a:prstGeom prst="rect">
             <a:avLst/>
@@ -4615,7 +5011,7 @@
         <p:spPr>
           <a:xfrm>
             <a:off x="360000" y="2880000"/>
-            <a:ext cx="9357480" cy="1617480"/>
+            <a:ext cx="9357120" cy="1617120"/>
           </a:xfrm>
           <a:prstGeom prst="rect">
             <a:avLst/>
@@ -4889,7 +5285,7 @@
         <p:spPr>
           <a:xfrm>
             <a:off x="360000" y="5220000"/>
-            <a:ext cx="2337480" cy="357480"/>
+            <a:ext cx="2337120" cy="357120"/>
           </a:xfrm>
           <a:prstGeom prst="rect">
             <a:avLst/>
@@ -4967,7 +5363,7 @@
         <p:spPr>
           <a:xfrm>
             <a:off x="3420000" y="5220000"/>
-            <a:ext cx="3237480" cy="357480"/>
+            <a:ext cx="3237120" cy="357120"/>
           </a:xfrm>
           <a:prstGeom prst="rect">
             <a:avLst/>
@@ -5045,7 +5441,7 @@
         <p:spPr>
           <a:xfrm>
             <a:off x="7380000" y="5220000"/>
-            <a:ext cx="2337480" cy="357480"/>
+            <a:ext cx="2337120" cy="357120"/>
           </a:xfrm>
           <a:prstGeom prst="rect">
             <a:avLst/>
@@ -5088,7 +5484,7 @@
                 <a:tab algn="l" pos="0"/>
               </a:tabLst>
             </a:pPr>
-            <a:fld id="{896901EF-EDE9-4027-BE74-0B75CD7D0CB4}" type="slidenum">
+            <a:fld id="{C16A1E7D-750A-4E93-8C2E-CFBFFBB57F5C}" type="slidenum">
               <a:rPr b="0" lang="en-AU" sz="1400" strike="noStrike" u="none">
                 <a:solidFill>
                   <a:srgbClr val="ffffff"/>
@@ -5141,7 +5537,7 @@
         <p:spPr>
           <a:xfrm flipH="1" flipV="1">
             <a:off x="-2880" y="4497120"/>
-            <a:ext cx="10077480" cy="1167480"/>
+            <a:ext cx="10077120" cy="1167120"/>
           </a:xfrm>
           <a:prstGeom prst="flowChartDocument">
             <a:avLst/>
@@ -5533,7 +5929,7 @@
                 <a:srgbClr val="009bdd"/>
               </a:gs>
             </a:gsLst>
-            <a:lin ang="0"/>
+            <a:lin ang="10800000"/>
           </a:gradFill>
           <a:ln w="18000">
             <a:noFill/>
@@ -5585,7 +5981,7 @@
         <p:spPr>
           <a:xfrm>
             <a:off x="0" y="1620000"/>
-            <a:ext cx="8997480" cy="1077480"/>
+            <a:ext cx="8997120" cy="1077120"/>
           </a:xfrm>
           <a:prstGeom prst="rect">
             <a:avLst/>
@@ -5644,7 +6040,7 @@
         <p:spPr>
           <a:xfrm>
             <a:off x="360000" y="2880000"/>
-            <a:ext cx="9357480" cy="1617480"/>
+            <a:ext cx="9357120" cy="1617120"/>
           </a:xfrm>
           <a:prstGeom prst="rect">
             <a:avLst/>
@@ -5918,7 +6314,7 @@
         <p:spPr>
           <a:xfrm>
             <a:off x="360000" y="5220000"/>
-            <a:ext cx="2337480" cy="357480"/>
+            <a:ext cx="2337120" cy="357120"/>
           </a:xfrm>
           <a:prstGeom prst="rect">
             <a:avLst/>
@@ -5996,7 +6392,7 @@
         <p:spPr>
           <a:xfrm>
             <a:off x="3420000" y="5220000"/>
-            <a:ext cx="3237480" cy="357480"/>
+            <a:ext cx="3237120" cy="357120"/>
           </a:xfrm>
           <a:prstGeom prst="rect">
             <a:avLst/>
@@ -6074,7 +6470,7 @@
         <p:spPr>
           <a:xfrm>
             <a:off x="7380000" y="5220000"/>
-            <a:ext cx="2337480" cy="357480"/>
+            <a:ext cx="2337120" cy="357120"/>
           </a:xfrm>
           <a:prstGeom prst="rect">
             <a:avLst/>
@@ -6117,7 +6513,7 @@
                 <a:tab algn="l" pos="0"/>
               </a:tabLst>
             </a:pPr>
-            <a:fld id="{A6C6D004-4028-4646-9331-623751A79A19}" type="slidenum">
+            <a:fld id="{506547B3-13E6-46A6-B5F6-5DD006169172}" type="slidenum">
               <a:rPr b="0" lang="en-AU" sz="1400" strike="noStrike" u="none">
                 <a:solidFill>
                   <a:srgbClr val="ffffff"/>
@@ -6170,7 +6566,7 @@
         <p:spPr>
           <a:xfrm>
             <a:off x="0" y="0"/>
-            <a:ext cx="10074240" cy="717480"/>
+            <a:ext cx="10073880" cy="717120"/>
           </a:xfrm>
           <a:prstGeom prst="rect">
             <a:avLst/>
@@ -6610,7 +7006,7 @@
         <p:spPr>
           <a:xfrm>
             <a:off x="3240" y="5040000"/>
-            <a:ext cx="10074240" cy="628920"/>
+            <a:ext cx="10073880" cy="628560"/>
           </a:xfrm>
           <a:prstGeom prst="rect">
             <a:avLst/>
@@ -7054,7 +7450,7 @@
         <p:spPr>
           <a:xfrm>
             <a:off x="360000" y="180000"/>
-            <a:ext cx="9357480" cy="475560"/>
+            <a:ext cx="9357120" cy="475200"/>
           </a:xfrm>
           <a:prstGeom prst="rect">
             <a:avLst/>
@@ -7113,7 +7509,7 @@
         <p:spPr>
           <a:xfrm>
             <a:off x="360000" y="1080000"/>
-            <a:ext cx="9357480" cy="3597480"/>
+            <a:ext cx="9357120" cy="3597120"/>
           </a:xfrm>
           <a:prstGeom prst="rect">
             <a:avLst/>
@@ -7387,7 +7783,7 @@
         <p:spPr>
           <a:xfrm>
             <a:off x="360000" y="5220000"/>
-            <a:ext cx="2337480" cy="357480"/>
+            <a:ext cx="2337120" cy="357120"/>
           </a:xfrm>
           <a:prstGeom prst="rect">
             <a:avLst/>
@@ -7465,7 +7861,7 @@
         <p:spPr>
           <a:xfrm>
             <a:off x="3420000" y="5220000"/>
-            <a:ext cx="3237480" cy="357480"/>
+            <a:ext cx="3237120" cy="357120"/>
           </a:xfrm>
           <a:prstGeom prst="rect">
             <a:avLst/>
@@ -7543,7 +7939,7 @@
         <p:spPr>
           <a:xfrm>
             <a:off x="7380000" y="5220000"/>
-            <a:ext cx="2337480" cy="357480"/>
+            <a:ext cx="2337120" cy="357120"/>
           </a:xfrm>
           <a:prstGeom prst="rect">
             <a:avLst/>
@@ -7586,7 +7982,7 @@
                 <a:tab algn="l" pos="0"/>
               </a:tabLst>
             </a:pPr>
-            <a:fld id="{A46446E5-3CF5-43EE-8A87-28E606602EA9}" type="slidenum">
+            <a:fld id="{76401DF2-D80C-4D68-A3CB-8DE6776493FC}" type="slidenum">
               <a:rPr b="0" lang="en-AU" sz="1400" strike="noStrike" u="none">
                 <a:solidFill>
                   <a:srgbClr val="ffffff"/>
@@ -7639,7 +8035,7 @@
         <p:spPr>
           <a:xfrm flipH="1" flipV="1">
             <a:off x="-2160" y="4497840"/>
-            <a:ext cx="10078200" cy="1168200"/>
+            <a:ext cx="10077840" cy="1167840"/>
           </a:xfrm>
           <a:prstGeom prst="flowChartDocument">
             <a:avLst/>
@@ -8031,7 +8427,7 @@
                 <a:srgbClr val="009bdd"/>
               </a:gs>
             </a:gsLst>
-            <a:lin ang="0"/>
+            <a:lin ang="10800000"/>
           </a:gradFill>
           <a:ln w="18000">
             <a:noFill/>
@@ -8083,7 +8479,7 @@
         <p:spPr>
           <a:xfrm>
             <a:off x="0" y="1620000"/>
-            <a:ext cx="8998200" cy="1078200"/>
+            <a:ext cx="8997840" cy="1077840"/>
           </a:xfrm>
           <a:prstGeom prst="rect">
             <a:avLst/>
@@ -8142,7 +8538,7 @@
         <p:spPr>
           <a:xfrm>
             <a:off x="360000" y="2880000"/>
-            <a:ext cx="9358200" cy="1618200"/>
+            <a:ext cx="9357840" cy="1617840"/>
           </a:xfrm>
           <a:prstGeom prst="rect">
             <a:avLst/>
@@ -8416,7 +8812,7 @@
         <p:spPr>
           <a:xfrm>
             <a:off x="360000" y="5220000"/>
-            <a:ext cx="2338200" cy="358200"/>
+            <a:ext cx="2337840" cy="357840"/>
           </a:xfrm>
           <a:prstGeom prst="rect">
             <a:avLst/>
@@ -8494,7 +8890,7 @@
         <p:spPr>
           <a:xfrm>
             <a:off x="3420000" y="5220000"/>
-            <a:ext cx="3238200" cy="358200"/>
+            <a:ext cx="3237840" cy="357840"/>
           </a:xfrm>
           <a:prstGeom prst="rect">
             <a:avLst/>
@@ -8572,7 +8968,7 @@
         <p:spPr>
           <a:xfrm>
             <a:off x="7380000" y="5220000"/>
-            <a:ext cx="2338200" cy="358200"/>
+            <a:ext cx="2337840" cy="357840"/>
           </a:xfrm>
           <a:prstGeom prst="rect">
             <a:avLst/>
@@ -8615,7 +9011,7 @@
                 <a:tab algn="l" pos="0"/>
               </a:tabLst>
             </a:pPr>
-            <a:fld id="{D49A7F4A-ABE3-465A-AC98-3E03DF6F1621}" type="slidenum">
+            <a:fld id="{A80E30C3-87C0-4BA0-AD34-197364B21B1B}" type="slidenum">
               <a:rPr b="0" lang="en-AU" sz="1400" strike="noStrike" u="none">
                 <a:solidFill>
                   <a:srgbClr val="ffffff"/>
@@ -8668,7 +9064,7 @@
         <p:spPr>
           <a:xfrm>
             <a:off x="0" y="0"/>
-            <a:ext cx="10074960" cy="718200"/>
+            <a:ext cx="10074600" cy="717840"/>
           </a:xfrm>
           <a:prstGeom prst="rect">
             <a:avLst/>
@@ -9108,7 +9504,7 @@
         <p:spPr>
           <a:xfrm>
             <a:off x="3240" y="5040000"/>
-            <a:ext cx="10074960" cy="629640"/>
+            <a:ext cx="10074600" cy="629280"/>
           </a:xfrm>
           <a:prstGeom prst="rect">
             <a:avLst/>
@@ -9552,7 +9948,7 @@
         <p:spPr>
           <a:xfrm>
             <a:off x="360000" y="180000"/>
-            <a:ext cx="9358200" cy="476280"/>
+            <a:ext cx="9357840" cy="475920"/>
           </a:xfrm>
           <a:prstGeom prst="rect">
             <a:avLst/>
@@ -9611,7 +10007,7 @@
         <p:spPr>
           <a:xfrm>
             <a:off x="360000" y="1080000"/>
-            <a:ext cx="9358200" cy="3598200"/>
+            <a:ext cx="9357840" cy="3597840"/>
           </a:xfrm>
           <a:prstGeom prst="rect">
             <a:avLst/>
@@ -9885,7 +10281,7 @@
         <p:spPr>
           <a:xfrm>
             <a:off x="360000" y="5220000"/>
-            <a:ext cx="2338200" cy="358200"/>
+            <a:ext cx="2337840" cy="357840"/>
           </a:xfrm>
           <a:prstGeom prst="rect">
             <a:avLst/>
@@ -9963,7 +10359,7 @@
         <p:spPr>
           <a:xfrm>
             <a:off x="3420000" y="5220000"/>
-            <a:ext cx="3238200" cy="358200"/>
+            <a:ext cx="3237840" cy="357840"/>
           </a:xfrm>
           <a:prstGeom prst="rect">
             <a:avLst/>
@@ -10041,7 +10437,7 @@
         <p:spPr>
           <a:xfrm>
             <a:off x="7380000" y="5220000"/>
-            <a:ext cx="2338200" cy="358200"/>
+            <a:ext cx="2337840" cy="357840"/>
           </a:xfrm>
           <a:prstGeom prst="rect">
             <a:avLst/>
@@ -10084,7 +10480,7 @@
                 <a:tab algn="l" pos="0"/>
               </a:tabLst>
             </a:pPr>
-            <a:fld id="{885F3B4D-37B5-4A31-9EF6-CD0AA9EE5D8C}" type="slidenum">
+            <a:fld id="{3AFD00DB-6E48-431A-B231-A70635C0BD4D}" type="slidenum">
               <a:rPr b="0" lang="en-AU" sz="1400" strike="noStrike" u="none">
                 <a:solidFill>
                   <a:srgbClr val="ffffff"/>
@@ -10195,8 +10591,8 @@
         </p:nvSpPr>
         <p:spPr>
           <a:xfrm>
-            <a:off x="0" y="1617480"/>
-            <a:ext cx="8997480" cy="1082520"/>
+            <a:off x="0" y="1617120"/>
+            <a:ext cx="8997120" cy="1082880"/>
           </a:xfrm>
           <a:prstGeom prst="rect">
             <a:avLst/>
@@ -10284,8 +10680,8 @@
         </p:nvSpPr>
         <p:spPr>
           <a:xfrm>
-            <a:off x="360000" y="165600"/>
-            <a:ext cx="9357480" cy="504360"/>
+            <a:off x="360000" y="165240"/>
+            <a:ext cx="9357120" cy="504720"/>
           </a:xfrm>
           <a:prstGeom prst="rect">
             <a:avLst/>
@@ -10344,7 +10740,7 @@
         <p:spPr>
           <a:xfrm>
             <a:off x="360000" y="1080000"/>
-            <a:ext cx="9357480" cy="3597480"/>
+            <a:ext cx="9357120" cy="3597120"/>
           </a:xfrm>
           <a:prstGeom prst="rect">
             <a:avLst/>
@@ -10546,7 +10942,7 @@
         <p:txBody>
           <a:bodyPr/>
           <a:p>
-            <a:fld id="{65F54251-D99E-45D6-ABCD-C2A839C91532}" type="slidenum">
+            <a:fld id="{5DD4256A-3CDF-45C0-9299-61A360EE7C25}" type="slidenum">
               <a:t>10</a:t>
             </a:fld>
           </a:p>
@@ -10594,8 +10990,8 @@
         </p:nvSpPr>
         <p:spPr>
           <a:xfrm>
-            <a:off x="0" y="1618200"/>
-            <a:ext cx="8998200" cy="1081800"/>
+            <a:off x="0" y="1617840"/>
+            <a:ext cx="8997840" cy="1082160"/>
           </a:xfrm>
           <a:prstGeom prst="rect">
             <a:avLst/>
@@ -10683,8 +11079,8 @@
         </p:nvSpPr>
         <p:spPr>
           <a:xfrm>
-            <a:off x="360000" y="166320"/>
-            <a:ext cx="9358200" cy="503640"/>
+            <a:off x="360000" y="165960"/>
+            <a:ext cx="9357840" cy="504000"/>
           </a:xfrm>
           <a:prstGeom prst="rect">
             <a:avLst/>
@@ -10743,7 +11139,7 @@
         <p:spPr>
           <a:xfrm>
             <a:off x="628200" y="973800"/>
-            <a:ext cx="8847720" cy="3732120"/>
+            <a:ext cx="8847360" cy="3731760"/>
           </a:xfrm>
           <a:prstGeom prst="rect">
             <a:avLst/>
@@ -10768,7 +11164,7 @@
         <p:txBody>
           <a:bodyPr/>
           <a:p>
-            <a:fld id="{AFE83105-156B-4531-AE5C-C053D0254BCD}" type="slidenum">
+            <a:fld id="{7F679138-B0A1-4D8E-9942-081778ECB28D}" type="slidenum">
               <a:t>12</a:t>
             </a:fld>
           </a:p>
@@ -10816,8 +11212,8 @@
         </p:nvSpPr>
         <p:spPr>
           <a:xfrm>
-            <a:off x="360000" y="166320"/>
-            <a:ext cx="9358200" cy="503640"/>
+            <a:off x="360000" y="165960"/>
+            <a:ext cx="9357840" cy="504000"/>
           </a:xfrm>
           <a:prstGeom prst="rect">
             <a:avLst/>
@@ -10876,7 +11272,7 @@
         <p:spPr>
           <a:xfrm>
             <a:off x="39600" y="871920"/>
-            <a:ext cx="10080000" cy="3955320"/>
+            <a:ext cx="10079640" cy="3954960"/>
           </a:xfrm>
           <a:prstGeom prst="rect">
             <a:avLst/>
@@ -10901,7 +11297,7 @@
         <p:txBody>
           <a:bodyPr/>
           <a:p>
-            <a:fld id="{AA9D3F44-9F4A-48FA-92CA-8B951CC7C8F2}" type="slidenum">
+            <a:fld id="{8EBE608C-6E38-4EEE-8952-847FA79307C7}" type="slidenum">
               <a:t>13</a:t>
             </a:fld>
           </a:p>
@@ -10949,8 +11345,8 @@
         </p:nvSpPr>
         <p:spPr>
           <a:xfrm>
-            <a:off x="360000" y="166320"/>
-            <a:ext cx="9358200" cy="504000"/>
+            <a:off x="360000" y="165960"/>
+            <a:ext cx="9357840" cy="504360"/>
           </a:xfrm>
           <a:prstGeom prst="rect">
             <a:avLst/>
@@ -11009,7 +11405,7 @@
         <p:spPr>
           <a:xfrm>
             <a:off x="1186920" y="1283400"/>
-            <a:ext cx="7696080" cy="3094920"/>
+            <a:ext cx="7695720" cy="3094560"/>
           </a:xfrm>
           <a:prstGeom prst="rect">
             <a:avLst/>
@@ -11034,7 +11430,7 @@
         <p:txBody>
           <a:bodyPr/>
           <a:p>
-            <a:fld id="{65904EB1-9824-470A-81D0-06E8990C74B2}" type="slidenum">
+            <a:fld id="{35FAF888-21FA-46BA-AB32-6BB8653125BB}" type="slidenum">
               <a:t>14</a:t>
             </a:fld>
           </a:p>
@@ -11082,8 +11478,8 @@
         </p:nvSpPr>
         <p:spPr>
           <a:xfrm>
-            <a:off x="0" y="1618560"/>
-            <a:ext cx="8998560" cy="1081440"/>
+            <a:off x="0" y="1618200"/>
+            <a:ext cx="8998200" cy="1081800"/>
           </a:xfrm>
           <a:prstGeom prst="rect">
             <a:avLst/>
@@ -11171,8 +11567,8 @@
         </p:nvSpPr>
         <p:spPr>
           <a:xfrm>
-            <a:off x="360000" y="166680"/>
-            <a:ext cx="9358560" cy="503640"/>
+            <a:off x="360000" y="166320"/>
+            <a:ext cx="9358200" cy="504000"/>
           </a:xfrm>
           <a:prstGeom prst="rect">
             <a:avLst/>
@@ -11231,7 +11627,7 @@
         <p:spPr>
           <a:xfrm>
             <a:off x="1653480" y="1407240"/>
-            <a:ext cx="6762600" cy="2847240"/>
+            <a:ext cx="6762240" cy="2846880"/>
           </a:xfrm>
           <a:prstGeom prst="rect">
             <a:avLst/>
@@ -11256,7 +11652,7 @@
         <p:txBody>
           <a:bodyPr/>
           <a:p>
-            <a:fld id="{71590340-BF5A-488B-B3F0-51E43D48313A}" type="slidenum">
+            <a:fld id="{EF322DB7-C2DD-43F3-82FC-DA309858F5C8}" type="slidenum">
               <a:t>16</a:t>
             </a:fld>
           </a:p>
@@ -11304,8 +11700,8 @@
         </p:nvSpPr>
         <p:spPr>
           <a:xfrm>
-            <a:off x="360000" y="166680"/>
-            <a:ext cx="9358560" cy="503640"/>
+            <a:off x="360000" y="166320"/>
+            <a:ext cx="9358200" cy="504000"/>
           </a:xfrm>
           <a:prstGeom prst="rect">
             <a:avLst/>
@@ -11364,7 +11760,7 @@
         <p:spPr>
           <a:xfrm>
             <a:off x="39600" y="1434600"/>
-            <a:ext cx="10080000" cy="4527720"/>
+            <a:ext cx="10079640" cy="4527360"/>
           </a:xfrm>
           <a:prstGeom prst="rect">
             <a:avLst/>
@@ -11389,7 +11785,7 @@
         <p:txBody>
           <a:bodyPr/>
           <a:p>
-            <a:fld id="{A3834D5C-271F-4606-A688-DF3B32C3ADD5}" type="slidenum">
+            <a:fld id="{AAD89DC6-AECF-4A5E-97BC-44B5DD93D858}" type="slidenum">
               <a:t>17</a:t>
             </a:fld>
           </a:p>
@@ -11437,8 +11833,8 @@
         </p:nvSpPr>
         <p:spPr>
           <a:xfrm>
-            <a:off x="360000" y="166680"/>
-            <a:ext cx="9358560" cy="503640"/>
+            <a:off x="360000" y="166320"/>
+            <a:ext cx="9358200" cy="504000"/>
           </a:xfrm>
           <a:prstGeom prst="rect">
             <a:avLst/>
@@ -11497,7 +11893,7 @@
         <p:spPr>
           <a:xfrm>
             <a:off x="39600" y="1571760"/>
-            <a:ext cx="10080000" cy="2555280"/>
+            <a:ext cx="10079640" cy="2554920"/>
           </a:xfrm>
           <a:prstGeom prst="rect">
             <a:avLst/>
@@ -11522,7 +11918,7 @@
         <p:txBody>
           <a:bodyPr/>
           <a:p>
-            <a:fld id="{D830E807-65B5-47CC-8C6E-B00EF9E7DDB6}" type="slidenum">
+            <a:fld id="{16AEC8B7-8C41-40A6-A55A-60EF7096C3B4}" type="slidenum">
               <a:t>18</a:t>
             </a:fld>
           </a:p>
@@ -11570,8 +11966,8 @@
         </p:nvSpPr>
         <p:spPr>
           <a:xfrm>
-            <a:off x="360000" y="166680"/>
-            <a:ext cx="9358560" cy="503640"/>
+            <a:off x="360000" y="166320"/>
+            <a:ext cx="9358200" cy="504000"/>
           </a:xfrm>
           <a:prstGeom prst="rect">
             <a:avLst/>
@@ -11630,7 +12026,7 @@
         <p:spPr>
           <a:xfrm>
             <a:off x="39600" y="1403640"/>
-            <a:ext cx="10080000" cy="3746160"/>
+            <a:ext cx="10079640" cy="3745800"/>
           </a:xfrm>
           <a:prstGeom prst="rect">
             <a:avLst/>
@@ -11655,7 +12051,7 @@
         <p:txBody>
           <a:bodyPr/>
           <a:p>
-            <a:fld id="{2E31F7C3-6FB9-484C-AA23-821A2D8CE897}" type="slidenum">
+            <a:fld id="{408AD97C-400D-468E-912A-8C5CB23D3F74}" type="slidenum">
               <a:t>19</a:t>
             </a:fld>
           </a:p>
@@ -11703,8 +12099,8 @@
         </p:nvSpPr>
         <p:spPr>
           <a:xfrm>
-            <a:off x="360000" y="165600"/>
-            <a:ext cx="9357480" cy="504360"/>
+            <a:off x="360000" y="165240"/>
+            <a:ext cx="9357120" cy="504720"/>
           </a:xfrm>
           <a:prstGeom prst="rect">
             <a:avLst/>
@@ -11763,7 +12159,7 @@
         <p:spPr>
           <a:xfrm>
             <a:off x="360000" y="1080000"/>
-            <a:ext cx="9357480" cy="3597480"/>
+            <a:ext cx="9357120" cy="3597120"/>
           </a:xfrm>
           <a:prstGeom prst="rect">
             <a:avLst/>
@@ -11934,8 +12330,362 @@
         <p:txBody>
           <a:bodyPr/>
           <a:p>
-            <a:fld id="{246911A0-BAFA-47D4-9481-E4F2430A1C66}" type="slidenum">
+            <a:fld id="{F6CDE720-1098-4811-AC6E-CEA3BAE2F23D}" type="slidenum">
               <a:t>2</a:t>
+            </a:fld>
+          </a:p>
+        </p:txBody>
+      </p:sp>
+    </p:spTree>
+  </p:cSld>
+  <mc:AlternateContent>
+    <mc:Choice Requires="p14">
+      <p:transition spd="slow" p14:dur="2000"/>
+    </mc:Choice>
+    <mc:Fallback>
+      <p:transition spd="slow"/>
+    </mc:Fallback>
+  </mc:AlternateContent>
+</p:sld>
+</file>
+
+<file path=ppt/slides/slide20.xml><?xml version="1.0" encoding="utf-8"?>
+<p:sld xmlns:a="http://schemas.openxmlformats.org/drawingml/2006/main" xmlns:p="http://schemas.openxmlformats.org/presentationml/2006/main" xmlns:r="http://schemas.openxmlformats.org/officeDocument/2006/relationships" xmlns:p14="http://schemas.microsoft.com/office/powerpoint/2010/main" xmlns:p15="http://schemas.microsoft.com/office/powerpoint/2012/main" xmlns:mc="http://schemas.openxmlformats.org/markup-compatibility/2006">
+  <p:cSld>
+    <p:spTree>
+      <p:nvGrpSpPr>
+        <p:cNvPr id="1" name=""/>
+        <p:cNvGrpSpPr/>
+        <p:nvPr/>
+      </p:nvGrpSpPr>
+      <p:grpSpPr>
+        <a:xfrm>
+          <a:off x="0" y="0"/>
+          <a:ext cx="0" cy="0"/>
+          <a:chOff x="0" y="0"/>
+          <a:chExt cx="0" cy="0"/>
+        </a:xfrm>
+      </p:grpSpPr>
+      <p:sp>
+        <p:nvSpPr>
+          <p:cNvPr id="73" name="PlaceHolder 1"/>
+          <p:cNvSpPr>
+            <a:spLocks noGrp="1"/>
+          </p:cNvSpPr>
+          <p:nvPr>
+            <p:ph type="title"/>
+          </p:nvPr>
+        </p:nvSpPr>
+        <p:spPr>
+          <a:xfrm>
+            <a:off x="360000" y="166320"/>
+            <a:ext cx="9358200" cy="504000"/>
+          </a:xfrm>
+          <a:prstGeom prst="rect">
+            <a:avLst/>
+          </a:prstGeom>
+          <a:noFill/>
+          <a:ln w="0">
+            <a:noFill/>
+          </a:ln>
+        </p:spPr>
+        <p:txBody>
+          <a:bodyPr lIns="0" rIns="0" tIns="0" bIns="0" anchor="ctr">
+            <a:spAutoFit/>
+          </a:bodyPr>
+          <a:p>
+            <a:pPr indent="0" algn="ctr">
+              <a:lnSpc>
+                <a:spcPct val="100000"/>
+              </a:lnSpc>
+              <a:buNone/>
+              <a:tabLst>
+                <a:tab algn="l" pos="0"/>
+              </a:tabLst>
+            </a:pPr>
+            <a:r>
+              <a:rPr b="0" lang="en-AU" sz="3300" strike="noStrike" u="none">
+                <a:solidFill>
+                  <a:srgbClr val="eeeeee"/>
+                </a:solidFill>
+                <a:effectLst/>
+                <a:uFillTx/>
+                <a:latin typeface="Arial"/>
+              </a:rPr>
+              <a:t>Query Semantic Search</a:t>
+            </a:r>
+            <a:endParaRPr b="0" lang="en-AU" sz="3300" strike="noStrike" u="none">
+              <a:solidFill>
+                <a:srgbClr val="000000"/>
+              </a:solidFill>
+              <a:effectLst/>
+              <a:uFillTx/>
+              <a:latin typeface="Arial"/>
+            </a:endParaRPr>
+          </a:p>
+        </p:txBody>
+      </p:sp>
+      <p:sp>
+        <p:nvSpPr>
+          <p:cNvPr id="74" name=""/>
+          <p:cNvSpPr txBox="1"/>
+          <p:nvPr/>
+        </p:nvSpPr>
+        <p:spPr>
+          <a:xfrm>
+            <a:off x="315720" y="878040"/>
+            <a:ext cx="9529920" cy="3887640"/>
+          </a:xfrm>
+          <a:prstGeom prst="rect">
+            <a:avLst/>
+          </a:prstGeom>
+          <a:noFill/>
+          <a:ln w="0">
+            <a:noFill/>
+          </a:ln>
+        </p:spPr>
+        <p:txBody>
+          <a:bodyPr lIns="90000" rIns="90000" tIns="45000" bIns="45000" anchor="t">
+            <a:spAutoFit/>
+          </a:bodyPr>
+          <a:p>
+            <a:pPr marL="216000" indent="-216000">
+              <a:buClr>
+                <a:srgbClr val="000000"/>
+              </a:buClr>
+              <a:buSzPct val="45000"/>
+              <a:buFont typeface="Wingdings" charset="2"/>
+              <a:buChar char=""/>
+            </a:pPr>
+            <a:r>
+              <a:rPr b="0" lang="en-AU" sz="3200" strike="noStrike" u="none">
+                <a:solidFill>
+                  <a:srgbClr val="009bdd"/>
+                </a:solidFill>
+                <a:effectLst/>
+                <a:uFillTx/>
+                <a:latin typeface="Arial"/>
+              </a:rPr>
+              <a:t>Query “</a:t>
+            </a:r>
+            <a:r>
+              <a:rPr b="0" i="1" lang="en-AU" sz="3200" strike="noStrike" u="none">
+                <a:solidFill>
+                  <a:srgbClr val="009bdd"/>
+                </a:solidFill>
+                <a:effectLst/>
+                <a:uFillTx/>
+                <a:latin typeface="Arial"/>
+              </a:rPr>
+              <a:t>XSS issues</a:t>
+            </a:r>
+            <a:r>
+              <a:rPr b="0" lang="en-AU" sz="3200" strike="noStrike" u="none">
+                <a:solidFill>
+                  <a:srgbClr val="009bdd"/>
+                </a:solidFill>
+                <a:effectLst/>
+                <a:uFillTx/>
+                <a:latin typeface="Arial"/>
+              </a:rPr>
+              <a:t>”</a:t>
+            </a:r>
+            <a:endParaRPr b="0" lang="en-AU" sz="3200" strike="noStrike" u="none">
+              <a:solidFill>
+                <a:srgbClr val="000000"/>
+              </a:solidFill>
+              <a:effectLst/>
+              <a:uFillTx/>
+              <a:latin typeface="Arial"/>
+            </a:endParaRPr>
+          </a:p>
+          <a:p>
+            <a:pPr marL="216000" indent="-216000">
+              <a:buClr>
+                <a:srgbClr val="000000"/>
+              </a:buClr>
+              <a:buSzPct val="45000"/>
+              <a:buFont typeface="Wingdings" charset="2"/>
+              <a:buChar char=""/>
+            </a:pPr>
+            <a:r>
+              <a:rPr b="0" lang="en-AU" sz="3200" strike="noStrike" u="none">
+                <a:solidFill>
+                  <a:srgbClr val="009bdd"/>
+                </a:solidFill>
+                <a:effectLst/>
+                <a:uFillTx/>
+                <a:latin typeface="Arial"/>
+              </a:rPr>
+              <a:t> </a:t>
+            </a:r>
+            <a:endParaRPr b="0" lang="en-AU" sz="3200" strike="noStrike" u="none">
+              <a:solidFill>
+                <a:srgbClr val="000000"/>
+              </a:solidFill>
+              <a:effectLst/>
+              <a:uFillTx/>
+              <a:latin typeface="Arial"/>
+            </a:endParaRPr>
+          </a:p>
+          <a:p>
+            <a:pPr marL="216000" indent="-216000">
+              <a:buClr>
+                <a:srgbClr val="000000"/>
+              </a:buClr>
+              <a:buSzPct val="45000"/>
+              <a:buFont typeface="Wingdings" charset="2"/>
+              <a:buChar char=""/>
+            </a:pPr>
+            <a:r>
+              <a:rPr b="0" lang="en-AU" sz="3200" strike="noStrike" u="none">
+                <a:solidFill>
+                  <a:srgbClr val="009bdd"/>
+                </a:solidFill>
+                <a:effectLst/>
+                <a:uFillTx/>
+                <a:latin typeface="Arial"/>
+              </a:rPr>
+              <a:t>Semantic search returns:</a:t>
+            </a:r>
+            <a:endParaRPr b="0" lang="en-AU" sz="3200" strike="noStrike" u="none">
+              <a:solidFill>
+                <a:srgbClr val="000000"/>
+              </a:solidFill>
+              <a:effectLst/>
+              <a:uFillTx/>
+              <a:latin typeface="Arial"/>
+            </a:endParaRPr>
+          </a:p>
+          <a:p>
+            <a:pPr marL="216000" indent="-216000">
+              <a:buClr>
+                <a:srgbClr val="000000"/>
+              </a:buClr>
+              <a:buSzPct val="45000"/>
+              <a:buFont typeface="Wingdings" charset="2"/>
+              <a:buChar char=""/>
+            </a:pPr>
+            <a:r>
+              <a:rPr b="0" lang="en-AU" sz="3200" strike="noStrike" u="none">
+                <a:solidFill>
+                  <a:srgbClr val="009bdd"/>
+                </a:solidFill>
+                <a:effectLst/>
+                <a:uFillTx/>
+                <a:latin typeface="Arial"/>
+              </a:rPr>
+              <a:t> </a:t>
+            </a:r>
+            <a:endParaRPr b="0" lang="en-AU" sz="3200" strike="noStrike" u="none">
+              <a:solidFill>
+                <a:srgbClr val="000000"/>
+              </a:solidFill>
+              <a:effectLst/>
+              <a:uFillTx/>
+              <a:latin typeface="Arial"/>
+            </a:endParaRPr>
+          </a:p>
+          <a:p>
+            <a:pPr marL="216000" indent="-216000">
+              <a:spcBef>
+                <a:spcPts val="1191"/>
+              </a:spcBef>
+              <a:spcAft>
+                <a:spcPts val="992"/>
+              </a:spcAft>
+              <a:buClr>
+                <a:srgbClr val="000000"/>
+              </a:buClr>
+              <a:buSzPct val="45000"/>
+              <a:buFont typeface="Wingdings" charset="2"/>
+              <a:buChar char=""/>
+            </a:pPr>
+            <a:r>
+              <a:rPr b="0" i="1" lang="en-AU" sz="3200" strike="noStrike" u="none">
+                <a:solidFill>
+                  <a:srgbClr val="000000"/>
+                </a:solidFill>
+                <a:effectLst/>
+                <a:uFillTx/>
+                <a:latin typeface="Arial"/>
+              </a:rPr>
+              <a:t>The installed version of Jenkins server was affected by a number of security vulnerabilities. Known vulnerabilities included CSRF and </a:t>
+            </a:r>
+            <a:r>
+              <a:rPr b="1" i="1" lang="en-AU" sz="3200" strike="noStrike" u="sng">
+                <a:solidFill>
+                  <a:srgbClr val="000000"/>
+                </a:solidFill>
+                <a:effectLst/>
+                <a:highlight>
+                  <a:srgbClr val="ffffff"/>
+                </a:highlight>
+                <a:uFillTx/>
+                <a:latin typeface="Arial"/>
+              </a:rPr>
+              <a:t>XSS</a:t>
+            </a:r>
+            <a:r>
+              <a:rPr b="0" i="1" lang="en-AU" sz="3200" strike="noStrike" u="none">
+                <a:solidFill>
+                  <a:srgbClr val="000000"/>
+                </a:solidFill>
+                <a:effectLst/>
+                <a:uFillTx/>
+                <a:latin typeface="Arial"/>
+              </a:rPr>
+              <a:t> weaknesses.</a:t>
+            </a:r>
+            <a:r>
+              <a:rPr b="0" lang="en-AU" sz="3200" strike="noStrike" u="none">
+                <a:solidFill>
+                  <a:srgbClr val="009bdd"/>
+                </a:solidFill>
+                <a:effectLst/>
+                <a:uFillTx/>
+                <a:latin typeface="Arial"/>
+              </a:rPr>
+              <a:t> </a:t>
+            </a:r>
+            <a:r>
+              <a:rPr b="0" lang="en-AU" sz="2800" strike="noStrike" u="none">
+                <a:solidFill>
+                  <a:srgbClr val="009bdd"/>
+                </a:solidFill>
+                <a:effectLst/>
+                <a:uFillTx/>
+                <a:latin typeface="Arial"/>
+              </a:rPr>
+              <a:t> </a:t>
+            </a:r>
+            <a:endParaRPr b="0" lang="en-AU" sz="2800" strike="noStrike" u="none">
+              <a:solidFill>
+                <a:srgbClr val="000000"/>
+              </a:solidFill>
+              <a:effectLst/>
+              <a:uFillTx/>
+              <a:latin typeface="Arial"/>
+            </a:endParaRPr>
+          </a:p>
+        </p:txBody>
+      </p:sp>
+      <p:sp>
+        <p:nvSpPr>
+          <p:cNvPr id="3" name="PlaceHolder 2"/>
+          <p:cNvSpPr>
+            <a:spLocks noGrp="1"/>
+          </p:cNvSpPr>
+          <p:nvPr>
+            <p:ph type="sldNum" idx="12"/>
+          </p:nvPr>
+        </p:nvSpPr>
+        <p:spPr/>
+        <p:txBody>
+          <a:bodyPr/>
+          <a:p>
+            <a:fld id="{1AE7CB1E-46C4-40B3-8F34-F97FCE25D822}" type="slidenum">
+              <a:t>20</a:t>
             </a:fld>
           </a:p>
         </p:txBody>
@@ -11982,8 +12732,8 @@
         </p:nvSpPr>
         <p:spPr>
           <a:xfrm>
-            <a:off x="360000" y="165600"/>
-            <a:ext cx="9357480" cy="504360"/>
+            <a:off x="360000" y="165240"/>
+            <a:ext cx="9357120" cy="504720"/>
           </a:xfrm>
           <a:prstGeom prst="rect">
             <a:avLst/>
@@ -12042,7 +12792,7 @@
         <p:spPr>
           <a:xfrm>
             <a:off x="360000" y="1080000"/>
-            <a:ext cx="9357480" cy="3597480"/>
+            <a:ext cx="9357120" cy="3597120"/>
           </a:xfrm>
           <a:prstGeom prst="rect">
             <a:avLst/>
@@ -12179,7 +12929,7 @@
         <p:txBody>
           <a:bodyPr/>
           <a:p>
-            <a:fld id="{845FB548-9875-48D4-B867-7AA13B8F6986}" type="slidenum">
+            <a:fld id="{C250274B-131E-4446-AEAB-57262E329DD9}" type="slidenum">
               <a:t>3</a:t>
             </a:fld>
           </a:p>
@@ -12227,8 +12977,8 @@
         </p:nvSpPr>
         <p:spPr>
           <a:xfrm>
-            <a:off x="360000" y="165600"/>
-            <a:ext cx="9357480" cy="504360"/>
+            <a:off x="360000" y="165240"/>
+            <a:ext cx="9357120" cy="504720"/>
           </a:xfrm>
           <a:prstGeom prst="rect">
             <a:avLst/>
@@ -12287,7 +13037,7 @@
         <p:spPr>
           <a:xfrm>
             <a:off x="360000" y="1080000"/>
-            <a:ext cx="9357480" cy="3597480"/>
+            <a:ext cx="9357120" cy="3597120"/>
           </a:xfrm>
           <a:prstGeom prst="rect">
             <a:avLst/>
@@ -12459,7 +13209,7 @@
         <p:txBody>
           <a:bodyPr/>
           <a:p>
-            <a:fld id="{DE7AF3F3-8C9D-4954-A4E4-B479289EE4AF}" type="slidenum">
+            <a:fld id="{BB19FB97-0456-45D0-BF20-F24DB36DA58F}" type="slidenum">
               <a:t>4</a:t>
             </a:fld>
           </a:p>
@@ -12507,8 +13257,8 @@
         </p:nvSpPr>
         <p:spPr>
           <a:xfrm>
-            <a:off x="360000" y="165600"/>
-            <a:ext cx="9357480" cy="504360"/>
+            <a:off x="360000" y="165240"/>
+            <a:ext cx="9357120" cy="504720"/>
           </a:xfrm>
           <a:prstGeom prst="rect">
             <a:avLst/>
@@ -12567,7 +13317,7 @@
         <p:spPr>
           <a:xfrm>
             <a:off x="360000" y="1080000"/>
-            <a:ext cx="9357480" cy="3597480"/>
+            <a:ext cx="9357120" cy="3597120"/>
           </a:xfrm>
           <a:prstGeom prst="rect">
             <a:avLst/>
@@ -12842,7 +13592,7 @@
         <p:txBody>
           <a:bodyPr/>
           <a:p>
-            <a:fld id="{D44DE52A-DD6A-465C-9C79-C36AA75437E8}" type="slidenum">
+            <a:fld id="{72A1F916-4B22-48D4-8155-D86E68A788E8}" type="slidenum">
               <a:t>5</a:t>
             </a:fld>
           </a:p>
@@ -12890,8 +13640,8 @@
         </p:nvSpPr>
         <p:spPr>
           <a:xfrm>
-            <a:off x="360000" y="165600"/>
-            <a:ext cx="9357480" cy="504360"/>
+            <a:off x="360000" y="165240"/>
+            <a:ext cx="9357120" cy="504720"/>
           </a:xfrm>
           <a:prstGeom prst="rect">
             <a:avLst/>
@@ -12950,7 +13700,7 @@
         <p:spPr>
           <a:xfrm>
             <a:off x="360000" y="1080000"/>
-            <a:ext cx="9357480" cy="3597480"/>
+            <a:ext cx="9357120" cy="3597120"/>
           </a:xfrm>
           <a:prstGeom prst="rect">
             <a:avLst/>
@@ -13190,7 +13940,7 @@
         <p:txBody>
           <a:bodyPr/>
           <a:p>
-            <a:fld id="{218E39A3-2588-4E6F-B44A-E56539DF1C03}" type="slidenum">
+            <a:fld id="{B0E046A5-F5E7-49C8-8342-4DDA3F276DAB}" type="slidenum">
               <a:t>6</a:t>
             </a:fld>
           </a:p>
@@ -13238,8 +13988,8 @@
         </p:nvSpPr>
         <p:spPr>
           <a:xfrm>
-            <a:off x="360000" y="165600"/>
-            <a:ext cx="9357480" cy="504360"/>
+            <a:off x="360000" y="165240"/>
+            <a:ext cx="9357120" cy="504720"/>
           </a:xfrm>
           <a:prstGeom prst="rect">
             <a:avLst/>
@@ -13298,7 +14048,7 @@
         <p:spPr>
           <a:xfrm>
             <a:off x="360000" y="1080000"/>
-            <a:ext cx="9357480" cy="3597480"/>
+            <a:ext cx="9357120" cy="3597120"/>
           </a:xfrm>
           <a:prstGeom prst="rect">
             <a:avLst/>
@@ -13512,7 +14262,7 @@
         <p:txBody>
           <a:bodyPr/>
           <a:p>
-            <a:fld id="{FF338A68-03B0-4C7B-9FE1-F494A80E59FD}" type="slidenum">
+            <a:fld id="{6261A672-F732-4395-B363-2F8E370AA5AF}" type="slidenum">
               <a:t>7</a:t>
             </a:fld>
           </a:p>
@@ -13560,8 +14310,8 @@
         </p:nvSpPr>
         <p:spPr>
           <a:xfrm>
-            <a:off x="360000" y="165600"/>
-            <a:ext cx="9357480" cy="504360"/>
+            <a:off x="360000" y="165240"/>
+            <a:ext cx="9357120" cy="504720"/>
           </a:xfrm>
           <a:prstGeom prst="rect">
             <a:avLst/>
@@ -13620,7 +14370,7 @@
         <p:spPr>
           <a:xfrm>
             <a:off x="360000" y="1080000"/>
-            <a:ext cx="9357480" cy="3597480"/>
+            <a:ext cx="9357120" cy="3597120"/>
           </a:xfrm>
           <a:prstGeom prst="rect">
             <a:avLst/>
@@ -13869,7 +14619,7 @@
         <p:txBody>
           <a:bodyPr/>
           <a:p>
-            <a:fld id="{4D0BCB79-193E-40EA-9529-D18BA90F7750}" type="slidenum">
+            <a:fld id="{E1982FE6-F4E6-4067-B71B-DDF40B987442}" type="slidenum">
               <a:t>8</a:t>
             </a:fld>
           </a:p>
@@ -13917,8 +14667,8 @@
         </p:nvSpPr>
         <p:spPr>
           <a:xfrm>
-            <a:off x="360000" y="165600"/>
-            <a:ext cx="9357480" cy="504360"/>
+            <a:off x="360000" y="165240"/>
+            <a:ext cx="9357120" cy="504720"/>
           </a:xfrm>
           <a:prstGeom prst="rect">
             <a:avLst/>
@@ -13977,7 +14727,7 @@
         <p:spPr>
           <a:xfrm>
             <a:off x="360000" y="1080000"/>
-            <a:ext cx="9357480" cy="3597480"/>
+            <a:ext cx="9357120" cy="3597120"/>
           </a:xfrm>
           <a:prstGeom prst="rect">
             <a:avLst/>
@@ -14169,7 +14919,7 @@
         <p:txBody>
           <a:bodyPr/>
           <a:p>
-            <a:fld id="{1C7F6FC8-7BF6-47DE-AE12-855F17E519BC}" type="slidenum">
+            <a:fld id="{4560748D-DD3C-420F-8D8E-030CE50F1DE9}" type="slidenum">
               <a:t>9</a:t>
             </a:fld>
           </a:p>

</xml_diff>